<commit_message>
slides create/update for directory MPI
</commit_message>
<xml_diff>
--- a/slides/MPI/MPI-introduction.pptx
+++ b/slides/MPI/MPI-introduction.pptx
@@ -5,7 +5,7 @@
     <p:sldMasterId id="2147483648" r:id="rId1"/>
   </p:sldMasterIdLst>
   <p:notesMasterIdLst>
-    <p:notesMasterId r:id="rId27"/>
+    <p:notesMasterId r:id="rId29"/>
   </p:notesMasterIdLst>
   <p:sldIdLst>
     <p:sldId id="257" r:id="rId2"/>
@@ -22,17 +22,19 @@
     <p:sldId id="275" r:id="rId13"/>
     <p:sldId id="276" r:id="rId14"/>
     <p:sldId id="296" r:id="rId15"/>
-    <p:sldId id="297" r:id="rId16"/>
-    <p:sldId id="298" r:id="rId17"/>
-    <p:sldId id="299" r:id="rId18"/>
-    <p:sldId id="300" r:id="rId19"/>
-    <p:sldId id="301" r:id="rId20"/>
-    <p:sldId id="302" r:id="rId21"/>
-    <p:sldId id="290" r:id="rId22"/>
-    <p:sldId id="294" r:id="rId23"/>
-    <p:sldId id="303" r:id="rId24"/>
-    <p:sldId id="305" r:id="rId25"/>
-    <p:sldId id="307" r:id="rId26"/>
+    <p:sldId id="308" r:id="rId16"/>
+    <p:sldId id="309" r:id="rId17"/>
+    <p:sldId id="297" r:id="rId18"/>
+    <p:sldId id="298" r:id="rId19"/>
+    <p:sldId id="299" r:id="rId20"/>
+    <p:sldId id="300" r:id="rId21"/>
+    <p:sldId id="301" r:id="rId22"/>
+    <p:sldId id="302" r:id="rId23"/>
+    <p:sldId id="290" r:id="rId24"/>
+    <p:sldId id="294" r:id="rId25"/>
+    <p:sldId id="303" r:id="rId26"/>
+    <p:sldId id="305" r:id="rId27"/>
+    <p:sldId id="307" r:id="rId28"/>
   </p:sldIdLst>
   <p:sldSz cx="9144000" cy="6858000" type="screen4x3"/>
   <p:notesSz cx="6858000" cy="9144000"/>
@@ -1086,7 +1088,7 @@
             <a:fld id="{7924614C-2021-41A3-A8D6-151A605521B6}" type="slidenum">
               <a:rPr lang="en-US"/>
               <a:pPr/>
-              <a:t>15</a:t>
+              <a:t>17</a:t>
             </a:fld>
             <a:endParaRPr lang="en-US"/>
           </a:p>
@@ -1179,7 +1181,7 @@
             <a:fld id="{A042A998-480D-4FF7-8787-36D69D6E7970}" type="slidenum">
               <a:rPr lang="en-US"/>
               <a:pPr/>
-              <a:t>16</a:t>
+              <a:t>18</a:t>
             </a:fld>
             <a:endParaRPr lang="en-US"/>
           </a:p>
@@ -1288,7 +1290,7 @@
             <a:fld id="{A042A998-480D-4FF7-8787-36D69D6E7970}" type="slidenum">
               <a:rPr lang="en-US"/>
               <a:pPr/>
-              <a:t>17</a:t>
+              <a:t>19</a:t>
             </a:fld>
             <a:endParaRPr lang="en-US"/>
           </a:p>
@@ -1397,7 +1399,7 @@
             <a:fld id="{A042A998-480D-4FF7-8787-36D69D6E7970}" type="slidenum">
               <a:rPr lang="en-US"/>
               <a:pPr/>
-              <a:t>18</a:t>
+              <a:t>20</a:t>
             </a:fld>
             <a:endParaRPr lang="en-US"/>
           </a:p>
@@ -1506,7 +1508,7 @@
             <a:fld id="{A1DC6287-058E-491C-889B-C42D0F02D6F2}" type="slidenum">
               <a:rPr lang="en-US"/>
               <a:pPr/>
-              <a:t>19</a:t>
+              <a:t>21</a:t>
             </a:fld>
             <a:endParaRPr lang="en-US"/>
           </a:p>
@@ -1704,7 +1706,7 @@
             <a:fld id="{422E7AA1-3E28-4ACE-83EF-BA56FD9DBDD5}" type="slidenum">
               <a:rPr lang="en-US"/>
               <a:pPr/>
-              <a:t>20</a:t>
+              <a:t>22</a:t>
             </a:fld>
             <a:endParaRPr lang="en-US"/>
           </a:p>
@@ -1894,7 +1896,7 @@
             <a:fld id="{ECA89D60-6F87-492C-BE3C-73C80457F945}" type="slidenum">
               <a:rPr lang="en-US" smtClean="0"/>
               <a:pPr/>
-              <a:t>21</a:t>
+              <a:t>23</a:t>
             </a:fld>
             <a:endParaRPr lang="en-US" dirty="0"/>
           </a:p>
@@ -1976,7 +1978,7 @@
             <a:fld id="{ECA89D60-6F87-492C-BE3C-73C80457F945}" type="slidenum">
               <a:rPr lang="en-US" smtClean="0"/>
               <a:pPr/>
-              <a:t>22</a:t>
+              <a:t>24</a:t>
             </a:fld>
             <a:endParaRPr lang="en-US"/>
           </a:p>
@@ -2066,7 +2068,7 @@
                   <a:tab pos="9870308" algn="l"/>
                 </a:tabLst>
               </a:pPr>
-              <a:t>23</a:t>
+              <a:t>25</a:t>
             </a:fld>
             <a:endParaRPr lang="en-US" dirty="0"/>
           </a:p>
@@ -2181,7 +2183,7 @@
             <a:fld id="{C8A0EC1A-7236-488D-B906-6711028ECAA9}" type="slidenum">
               <a:rPr lang="en-US"/>
               <a:pPr/>
-              <a:t>24</a:t>
+              <a:t>26</a:t>
             </a:fld>
             <a:endParaRPr lang="en-US"/>
           </a:p>
@@ -2274,7 +2276,7 @@
             <a:fld id="{7A5704CE-2AB8-4A72-BAA2-08CA1A4F2BA1}" type="slidenum">
               <a:rPr lang="en-US"/>
               <a:pPr/>
-              <a:t>25</a:t>
+              <a:t>27</a:t>
             </a:fld>
             <a:endParaRPr lang="en-US"/>
           </a:p>
@@ -6052,15 +6054,7 @@
             </a:br>
             <a:r>
               <a:rPr lang="en-US" sz="3200" dirty="0" smtClean="0"/>
-              <a:t>Science &amp; </a:t>
-            </a:r>
-            <a:r>
-              <a:rPr lang="en-US" sz="3200" dirty="0" smtClean="0"/>
-              <a:t>Engineering</a:t>
-            </a:r>
-            <a:r>
-              <a:rPr lang="en-US" sz="3200" dirty="0" smtClean="0"/>
-              <a:t/>
+              <a:t>Science &amp; Engineering</a:t>
             </a:r>
             <a:br>
               <a:rPr lang="en-US" sz="3200" dirty="0" smtClean="0"/>
@@ -6114,17 +6108,8 @@
           <a:p>
             <a:r>
               <a:rPr lang="en-US" sz="2400" dirty="0" smtClean="0"/>
-              <a:t>Kent </a:t>
-            </a:r>
-            <a:r>
-              <a:rPr lang="en-US" sz="2400" dirty="0" smtClean="0"/>
-              <a:t>Milfeld, Research Associate, </a:t>
-            </a:r>
-            <a:r>
-              <a:rPr lang="en-US" sz="2400" dirty="0" smtClean="0"/>
-              <a:t>TACC</a:t>
-            </a:r>
-            <a:endParaRPr lang="en-US" sz="2400" dirty="0" smtClean="0"/>
+              <a:t>Kent Milfeld, Research Associate, TACC</a:t>
+            </a:r>
           </a:p>
         </p:txBody>
       </p:sp>
@@ -7599,414 +7584,157 @@
       </p:grpSpPr>
       <p:sp>
         <p:nvSpPr>
-          <p:cNvPr id="147458" name="Rectangle 2"/>
+          <p:cNvPr id="2" name="Title 1"/>
           <p:cNvSpPr>
-            <a:spLocks noGrp="1" noChangeArrowheads="1"/>
+            <a:spLocks noGrp="1"/>
           </p:cNvSpPr>
           <p:nvPr>
             <p:ph type="title"/>
           </p:nvPr>
         </p:nvSpPr>
-        <p:spPr>
-          <a:xfrm>
-            <a:off x="457200" y="0"/>
-            <a:ext cx="8229600" cy="1143000"/>
-          </a:xfrm>
-        </p:spPr>
+        <p:spPr/>
         <p:txBody>
           <a:bodyPr/>
           <a:lstStyle/>
           <a:p>
             <a:r>
-              <a:rPr lang="en-US" altLang="en-US" dirty="0"/>
-              <a:t>Minimal MPI program</a:t>
-            </a:r>
-          </a:p>
-        </p:txBody>
-      </p:sp>
-      <p:sp>
-        <p:nvSpPr>
-          <p:cNvPr id="147459" name="Rectangle 3"/>
+              <a:rPr lang="en-US" dirty="0" smtClean="0"/>
+              <a:t>Interactive scenario</a:t>
+            </a:r>
+            <a:endParaRPr lang="en-US" dirty="0"/>
+          </a:p>
+        </p:txBody>
+      </p:sp>
+      <p:pic>
+        <p:nvPicPr>
+          <p:cNvPr id="5" name="Content Placeholder 4" descr="mpi-interactive.jpeg"/>
+          <p:cNvPicPr>
+            <a:picLocks noGrp="1" noChangeAspect="1"/>
+          </p:cNvPicPr>
+          <p:nvPr>
+            <p:ph idx="1"/>
+          </p:nvPr>
+        </p:nvPicPr>
+        <p:blipFill rotWithShape="1">
+          <a:blip r:embed="rId2" cstate="print">
+            <a:extLst>
+              <a:ext uri="{28A0092B-C50C-407E-A947-70E740481C1C}">
+                <a14:useLocalDpi xmlns:a14="http://schemas.microsoft.com/office/drawing/2010/main" val="0"/>
+              </a:ext>
+            </a:extLst>
+          </a:blip>
+          <a:srcRect l="-8004" t="-1262" r="-6597" b="-3108"/>
+          <a:stretch/>
+        </p:blipFill>
+        <p:spPr>
+          <a:xfrm>
+            <a:off x="-731838" y="1295401"/>
+            <a:ext cx="10479088" cy="3886200"/>
+          </a:xfrm>
+        </p:spPr>
+      </p:pic>
+      <p:sp>
+        <p:nvSpPr>
+          <p:cNvPr id="4" name="Slide Number Placeholder 3"/>
           <p:cNvSpPr>
-            <a:spLocks noGrp="1" noChangeArrowheads="1"/>
+            <a:spLocks noGrp="1"/>
           </p:cNvSpPr>
           <p:nvPr>
-            <p:ph type="body" idx="1"/>
+            <p:ph type="sldNum" sz="quarter" idx="10"/>
           </p:nvPr>
         </p:nvSpPr>
-        <p:spPr>
-          <a:xfrm>
-            <a:off x="457200" y="1264919"/>
-            <a:ext cx="8229600" cy="4525963"/>
-          </a:xfrm>
-        </p:spPr>
+        <p:spPr/>
         <p:txBody>
           <a:bodyPr/>
           <a:lstStyle/>
           <a:p>
-            <a:r>
-              <a:rPr lang="en-US" altLang="en-US" dirty="0"/>
-              <a:t> Every MPI program needs these…</a:t>
-            </a:r>
-          </a:p>
-          <a:p>
-            <a:pPr lvl="1"/>
-            <a:r>
-              <a:rPr lang="en-US" altLang="en-US" dirty="0"/>
-              <a:t>C version</a:t>
-            </a:r>
-          </a:p>
-        </p:txBody>
-      </p:sp>
-      <p:sp>
-        <p:nvSpPr>
-          <p:cNvPr id="147460" name="Rectangle 4"/>
-          <p:cNvSpPr>
-            <a:spLocks noChangeArrowheads="1"/>
-          </p:cNvSpPr>
+            <a:fld id="{251D56EB-2375-43B7-8104-DD7EC416D89A}" type="slidenum">
+              <a:rPr lang="en-US" smtClean="0"/>
+              <a:pPr/>
+              <a:t>15</a:t>
+            </a:fld>
+            <a:endParaRPr lang="en-US"/>
+          </a:p>
+        </p:txBody>
+      </p:sp>
+      <p:sp>
+        <p:nvSpPr>
+          <p:cNvPr id="6" name="TextBox 5"/>
+          <p:cNvSpPr txBox="1"/>
           <p:nvPr/>
         </p:nvSpPr>
-        <p:spPr bwMode="auto">
-          <a:xfrm>
-            <a:off x="609600" y="2316162"/>
-            <a:ext cx="7620000" cy="2185214"/>
+        <p:spPr>
+          <a:xfrm>
+            <a:off x="10821" y="5181600"/>
+            <a:ext cx="4550194" cy="646331"/>
           </a:xfrm>
           <a:prstGeom prst="rect">
             <a:avLst/>
           </a:prstGeom>
           <a:noFill/>
-          <a:ln w="9525">
-            <a:noFill/>
-            <a:miter lim="800000"/>
-            <a:headEnd/>
-            <a:tailEnd/>
-          </a:ln>
-          <a:effectLst/>
-        </p:spPr>
-        <p:txBody>
-          <a:bodyPr wrap="square">
+        </p:spPr>
+        <p:txBody>
+          <a:bodyPr wrap="none" rtlCol="0">
             <a:spAutoFit/>
           </a:bodyPr>
           <a:lstStyle/>
           <a:p>
             <a:r>
-              <a:rPr lang="en-US" altLang="en-US" sz="2000" dirty="0" smtClean="0">
-                <a:latin typeface="Courier New" pitchFamily="49" charset="0"/>
-              </a:rPr>
-              <a:t>	#</a:t>
-            </a:r>
-            <a:r>
-              <a:rPr lang="en-US" altLang="en-US" sz="2000" dirty="0">
-                <a:latin typeface="Courier New" pitchFamily="49" charset="0"/>
-              </a:rPr>
-              <a:t>include &lt;</a:t>
-            </a:r>
-            <a:r>
-              <a:rPr lang="en-US" altLang="en-US" sz="2000" b="1" dirty="0" err="1">
-                <a:solidFill>
-                  <a:srgbClr val="0070C0"/>
-                </a:solidFill>
-                <a:latin typeface="Courier New" pitchFamily="49" charset="0"/>
-              </a:rPr>
-              <a:t>mpi.h</a:t>
-            </a:r>
-            <a:r>
-              <a:rPr lang="en-US" altLang="en-US" sz="2000" dirty="0">
-                <a:latin typeface="Courier New" pitchFamily="49" charset="0"/>
-              </a:rPr>
-              <a:t>&gt;                      </a:t>
-            </a:r>
-          </a:p>
-          <a:p>
-            <a:r>
-              <a:rPr lang="en-US" altLang="en-US" sz="1600" dirty="0" smtClean="0">
-                <a:latin typeface="Courier New" pitchFamily="49" charset="0"/>
-              </a:rPr>
-              <a:t>	 </a:t>
-            </a:r>
-            <a:r>
-              <a:rPr lang="en-US" altLang="en-US" sz="2000" dirty="0" smtClean="0">
-                <a:latin typeface="Courier New" pitchFamily="49" charset="0"/>
-              </a:rPr>
-              <a:t>...</a:t>
-            </a:r>
-          </a:p>
-          <a:p>
-            <a:r>
-              <a:rPr lang="en-US" altLang="en-US" sz="2000" dirty="0" smtClean="0">
-                <a:latin typeface="Courier New" pitchFamily="49" charset="0"/>
-              </a:rPr>
-              <a:t>	</a:t>
-            </a:r>
-            <a:r>
-              <a:rPr lang="en-US" altLang="en-US" sz="2000" dirty="0" err="1" smtClean="0">
-                <a:latin typeface="Courier New" pitchFamily="49" charset="0"/>
-              </a:rPr>
-              <a:t>ierr</a:t>
-            </a:r>
-            <a:r>
-              <a:rPr lang="en-US" altLang="en-US" sz="2000" dirty="0" smtClean="0">
-                <a:latin typeface="Courier New" pitchFamily="49" charset="0"/>
-              </a:rPr>
-              <a:t>=</a:t>
-            </a:r>
-            <a:r>
-              <a:rPr lang="en-US" altLang="en-US" sz="2000" b="1" dirty="0" err="1" smtClean="0">
-                <a:solidFill>
-                  <a:srgbClr val="0070C0"/>
-                </a:solidFill>
-                <a:latin typeface="Courier New" pitchFamily="49" charset="0"/>
-              </a:rPr>
-              <a:t>MPI_Init</a:t>
-            </a:r>
-            <a:r>
-              <a:rPr lang="en-US" altLang="en-US" sz="2000" dirty="0">
-                <a:latin typeface="Courier New" pitchFamily="49" charset="0"/>
-              </a:rPr>
-              <a:t>(&amp;</a:t>
-            </a:r>
-            <a:r>
-              <a:rPr lang="en-US" altLang="en-US" sz="2000" dirty="0" err="1">
-                <a:latin typeface="Courier New" pitchFamily="49" charset="0"/>
-              </a:rPr>
-              <a:t>argc</a:t>
-            </a:r>
-            <a:r>
-              <a:rPr lang="en-US" altLang="en-US" sz="2000" dirty="0">
-                <a:latin typeface="Courier New" pitchFamily="49" charset="0"/>
-              </a:rPr>
-              <a:t>, &amp;</a:t>
-            </a:r>
-            <a:r>
-              <a:rPr lang="en-US" altLang="en-US" sz="2000" dirty="0" err="1">
-                <a:latin typeface="Courier New" pitchFamily="49" charset="0"/>
-              </a:rPr>
-              <a:t>argv</a:t>
-            </a:r>
-            <a:r>
-              <a:rPr lang="en-US" altLang="en-US" sz="2000" dirty="0">
-                <a:latin typeface="Courier New" pitchFamily="49" charset="0"/>
-              </a:rPr>
-              <a:t>);              </a:t>
-            </a:r>
-            <a:endParaRPr lang="en-US" altLang="en-US" sz="1600" dirty="0">
-              <a:latin typeface="Courier New" pitchFamily="49" charset="0"/>
-            </a:endParaRPr>
-          </a:p>
-          <a:p>
-            <a:r>
-              <a:rPr lang="en-US" altLang="en-US" sz="2000" dirty="0" smtClean="0">
-                <a:latin typeface="Courier New" pitchFamily="49" charset="0"/>
-              </a:rPr>
-              <a:t>	</a:t>
-            </a:r>
-            <a:r>
-              <a:rPr lang="en-US" altLang="en-US" sz="2000" dirty="0" err="1" smtClean="0">
-                <a:latin typeface="Courier New" pitchFamily="49" charset="0"/>
-              </a:rPr>
-              <a:t>ierr</a:t>
-            </a:r>
-            <a:r>
-              <a:rPr lang="en-US" altLang="en-US" sz="2000" dirty="0" smtClean="0">
-                <a:latin typeface="Courier New" pitchFamily="49" charset="0"/>
-              </a:rPr>
-              <a:t>=</a:t>
-            </a:r>
-            <a:r>
-              <a:rPr lang="en-US" altLang="en-US" sz="2000" b="1" dirty="0" err="1" smtClean="0">
-                <a:solidFill>
-                  <a:srgbClr val="0070C0"/>
-                </a:solidFill>
-                <a:latin typeface="Courier New" pitchFamily="49" charset="0"/>
-              </a:rPr>
-              <a:t>MPI_Comm_size</a:t>
-            </a:r>
-            <a:r>
-              <a:rPr lang="en-US" altLang="en-US" sz="2000" dirty="0" smtClean="0">
-                <a:latin typeface="Courier New" pitchFamily="49" charset="0"/>
-              </a:rPr>
-              <a:t>(</a:t>
-            </a:r>
-            <a:r>
-              <a:rPr lang="en-US" altLang="en-US" sz="2000" dirty="0" err="1" smtClean="0">
-                <a:solidFill>
-                  <a:srgbClr val="0070C0"/>
-                </a:solidFill>
-                <a:latin typeface="Courier New" pitchFamily="49" charset="0"/>
-              </a:rPr>
-              <a:t>MPI_COMM_WORLD</a:t>
-            </a:r>
-            <a:r>
-              <a:rPr lang="en-US" altLang="en-US" sz="2000" dirty="0" err="1">
-                <a:latin typeface="Courier New" pitchFamily="49" charset="0"/>
-              </a:rPr>
-              <a:t>,&amp;npes</a:t>
-            </a:r>
-            <a:r>
-              <a:rPr lang="en-US" altLang="en-US" sz="2000" dirty="0">
-                <a:latin typeface="Courier New" pitchFamily="49" charset="0"/>
-              </a:rPr>
-              <a:t>); </a:t>
-            </a:r>
-            <a:r>
-              <a:rPr lang="en-US" altLang="en-US" sz="2000" dirty="0" smtClean="0">
-                <a:latin typeface="Courier New" pitchFamily="49" charset="0"/>
-              </a:rPr>
-              <a:t>	</a:t>
-            </a:r>
-            <a:r>
-              <a:rPr lang="en-US" altLang="en-US" sz="2000" dirty="0" err="1" smtClean="0">
-                <a:latin typeface="Courier New" pitchFamily="49" charset="0"/>
-              </a:rPr>
-              <a:t>ierr</a:t>
-            </a:r>
-            <a:r>
-              <a:rPr lang="en-US" altLang="en-US" sz="2000" dirty="0" smtClean="0">
-                <a:latin typeface="Courier New" pitchFamily="49" charset="0"/>
-              </a:rPr>
-              <a:t>=</a:t>
-            </a:r>
-            <a:r>
-              <a:rPr lang="en-US" altLang="en-US" sz="2000" b="1" dirty="0" err="1" smtClean="0">
-                <a:solidFill>
-                  <a:srgbClr val="0070C0"/>
-                </a:solidFill>
-                <a:latin typeface="Courier New" pitchFamily="49" charset="0"/>
-              </a:rPr>
-              <a:t>MPI_Comm_rank</a:t>
-            </a:r>
-            <a:r>
-              <a:rPr lang="en-US" altLang="en-US" sz="2000" dirty="0" smtClean="0">
-                <a:latin typeface="Courier New" pitchFamily="49" charset="0"/>
-              </a:rPr>
-              <a:t>(</a:t>
-            </a:r>
-            <a:r>
-              <a:rPr lang="en-US" altLang="en-US" sz="2000" dirty="0" err="1" smtClean="0">
-                <a:solidFill>
-                  <a:srgbClr val="0070C0"/>
-                </a:solidFill>
-                <a:latin typeface="Courier New" pitchFamily="49" charset="0"/>
-              </a:rPr>
-              <a:t>MPI_COMM_WORLD</a:t>
-            </a:r>
-            <a:r>
-              <a:rPr lang="en-US" altLang="en-US" sz="2000" dirty="0" err="1">
-                <a:latin typeface="Courier New" pitchFamily="49" charset="0"/>
-              </a:rPr>
-              <a:t>,&amp;iam</a:t>
-            </a:r>
-            <a:r>
-              <a:rPr lang="en-US" altLang="en-US" sz="2000" dirty="0">
-                <a:latin typeface="Courier New" pitchFamily="49" charset="0"/>
-              </a:rPr>
-              <a:t>);</a:t>
-            </a:r>
-          </a:p>
-          <a:p>
-            <a:r>
-              <a:rPr lang="en-US" altLang="en-US" sz="1600" dirty="0" smtClean="0">
-                <a:latin typeface="Courier New" pitchFamily="49" charset="0"/>
-              </a:rPr>
-              <a:t>	...</a:t>
-            </a:r>
-            <a:endParaRPr lang="en-US" altLang="en-US" sz="1600" dirty="0">
-              <a:latin typeface="Courier New" pitchFamily="49" charset="0"/>
-            </a:endParaRPr>
-          </a:p>
-          <a:p>
-            <a:r>
-              <a:rPr lang="en-US" altLang="en-US" sz="2000" dirty="0" smtClean="0">
-                <a:latin typeface="Courier New" pitchFamily="49" charset="0"/>
-              </a:rPr>
-              <a:t>	</a:t>
-            </a:r>
-            <a:r>
-              <a:rPr lang="en-US" altLang="en-US" sz="2000" dirty="0" err="1" smtClean="0">
-                <a:latin typeface="Courier New" pitchFamily="49" charset="0"/>
-              </a:rPr>
-              <a:t>ierr</a:t>
-            </a:r>
-            <a:r>
-              <a:rPr lang="en-US" altLang="en-US" sz="2000" dirty="0" smtClean="0">
-                <a:latin typeface="Courier New" pitchFamily="49" charset="0"/>
-              </a:rPr>
-              <a:t>=</a:t>
-            </a:r>
-            <a:r>
-              <a:rPr lang="en-US" altLang="en-US" sz="2000" b="1" dirty="0" err="1" smtClean="0">
-                <a:solidFill>
-                  <a:srgbClr val="0070C0"/>
-                </a:solidFill>
-                <a:latin typeface="Courier New" pitchFamily="49" charset="0"/>
-              </a:rPr>
-              <a:t>MPI_Finalize</a:t>
-            </a:r>
-            <a:r>
-              <a:rPr lang="en-US" altLang="en-US" sz="2000" dirty="0">
-                <a:latin typeface="Courier New" pitchFamily="49" charset="0"/>
-              </a:rPr>
-              <a:t>();</a:t>
-            </a:r>
-            <a:endParaRPr lang="en-US" altLang="en-US" sz="2400" dirty="0">
-              <a:latin typeface="Courier New" pitchFamily="49" charset="0"/>
-            </a:endParaRPr>
-          </a:p>
-        </p:txBody>
-      </p:sp>
-      <p:sp>
-        <p:nvSpPr>
-          <p:cNvPr id="147461" name="Rectangle 5"/>
-          <p:cNvSpPr>
-            <a:spLocks noChangeArrowheads="1"/>
-          </p:cNvSpPr>
-          <p:nvPr/>
-        </p:nvSpPr>
-        <p:spPr bwMode="auto">
-          <a:xfrm>
-            <a:off x="609600" y="4602162"/>
-            <a:ext cx="7543800" cy="1143000"/>
-          </a:xfrm>
-          <a:prstGeom prst="rect">
-            <a:avLst/>
-          </a:prstGeom>
-          <a:noFill/>
-          <a:ln w="9525">
-            <a:noFill/>
-            <a:miter lim="800000"/>
-            <a:headEnd/>
-            <a:tailEnd/>
-          </a:ln>
-          <a:effectLst/>
-        </p:spPr>
-        <p:txBody>
-          <a:bodyPr/>
-          <a:lstStyle/>
-          <a:p>
-            <a:r>
-              <a:rPr lang="en-US" altLang="en-US" sz="2800" b="0" dirty="0">
-                <a:solidFill>
-                  <a:schemeClr val="tx1"/>
-                </a:solidFill>
-                <a:latin typeface="Helvetica" pitchFamily="34" charset="0"/>
-              </a:rPr>
-              <a:t>In C MPI routines are functions which return the error value</a:t>
-            </a:r>
+              <a:rPr lang="en-US" dirty="0" smtClean="0"/>
+              <a:t>User type:</a:t>
+            </a:r>
+          </a:p>
+          <a:p>
+            <a:r>
+              <a:rPr lang="en-US" dirty="0" err="1"/>
+              <a:t>m</a:t>
+            </a:r>
+            <a:r>
+              <a:rPr lang="en-US" dirty="0" err="1" smtClean="0"/>
+              <a:t>pirun</a:t>
+            </a:r>
+            <a:r>
+              <a:rPr lang="en-US" dirty="0" smtClean="0"/>
+              <a:t> –</a:t>
+            </a:r>
+            <a:r>
+              <a:rPr lang="en-US" dirty="0" err="1" smtClean="0"/>
+              <a:t>np</a:t>
+            </a:r>
+            <a:r>
+              <a:rPr lang="en-US" dirty="0" smtClean="0"/>
+              <a:t> 5 </a:t>
+            </a:r>
+            <a:r>
+              <a:rPr lang="en-US" dirty="0" err="1" smtClean="0"/>
+              <a:t>hostfile</a:t>
+            </a:r>
+            <a:r>
+              <a:rPr lang="en-US" dirty="0" smtClean="0"/>
+              <a:t> ./</a:t>
+            </a:r>
+            <a:r>
+              <a:rPr lang="en-US" dirty="0" err="1" smtClean="0"/>
+              <a:t>myprogram</a:t>
+            </a:r>
+            <a:r>
+              <a:rPr lang="en-US" dirty="0" smtClean="0"/>
+              <a:t> arguments</a:t>
+            </a:r>
+            <a:endParaRPr lang="en-US" dirty="0"/>
           </a:p>
         </p:txBody>
       </p:sp>
     </p:spTree>
+    <p:extLst>
+      <p:ext uri="{BB962C8B-B14F-4D97-AF65-F5344CB8AC3E}">
+        <p14:creationId xmlns:p14="http://schemas.microsoft.com/office/powerpoint/2010/main" val="1110505275"/>
+      </p:ext>
+    </p:extLst>
   </p:cSld>
   <p:clrMapOvr>
     <a:masterClrMapping/>
   </p:clrMapOvr>
-  <p:timing>
-    <p:tnLst>
-      <p:par>
-        <p:cTn xmlns:p14="http://schemas.microsoft.com/office/powerpoint/2010/main" id="1" dur="indefinite" restart="never" nodeType="tmRoot"/>
-      </p:par>
-    </p:tnLst>
-  </p:timing>
 </p:sld>
 </file>
 
@@ -8029,7 +7757,144 @@
       </p:grpSpPr>
       <p:sp>
         <p:nvSpPr>
-          <p:cNvPr id="149506" name="Rectangle 2"/>
+          <p:cNvPr id="2" name="Title 1"/>
+          <p:cNvSpPr>
+            <a:spLocks noGrp="1"/>
+          </p:cNvSpPr>
+          <p:nvPr>
+            <p:ph type="title"/>
+          </p:nvPr>
+        </p:nvSpPr>
+        <p:spPr/>
+        <p:txBody>
+          <a:bodyPr/>
+          <a:lstStyle/>
+          <a:p>
+            <a:r>
+              <a:rPr lang="en-US" dirty="0" smtClean="0"/>
+              <a:t>Batch scenario</a:t>
+            </a:r>
+            <a:endParaRPr lang="en-US" dirty="0"/>
+          </a:p>
+        </p:txBody>
+      </p:sp>
+      <p:sp>
+        <p:nvSpPr>
+          <p:cNvPr id="3" name="Content Placeholder 2"/>
+          <p:cNvSpPr>
+            <a:spLocks noGrp="1"/>
+          </p:cNvSpPr>
+          <p:nvPr>
+            <p:ph idx="1"/>
+          </p:nvPr>
+        </p:nvSpPr>
+        <p:spPr>
+          <a:xfrm>
+            <a:off x="457200" y="5105400"/>
+            <a:ext cx="8229600" cy="1020763"/>
+          </a:xfrm>
+        </p:spPr>
+        <p:txBody>
+          <a:bodyPr>
+            <a:normAutofit lnSpcReduction="10000"/>
+          </a:bodyPr>
+          <a:lstStyle/>
+          <a:p>
+            <a:r>
+              <a:rPr lang="en-US" dirty="0" smtClean="0"/>
+              <a:t>User submits batch job to queue, executed later by scheduler</a:t>
+            </a:r>
+            <a:endParaRPr lang="en-US" dirty="0"/>
+          </a:p>
+        </p:txBody>
+      </p:sp>
+      <p:sp>
+        <p:nvSpPr>
+          <p:cNvPr id="4" name="Slide Number Placeholder 3"/>
+          <p:cNvSpPr>
+            <a:spLocks noGrp="1"/>
+          </p:cNvSpPr>
+          <p:nvPr>
+            <p:ph type="sldNum" sz="quarter" idx="10"/>
+          </p:nvPr>
+        </p:nvSpPr>
+        <p:spPr/>
+        <p:txBody>
+          <a:bodyPr/>
+          <a:lstStyle/>
+          <a:p>
+            <a:fld id="{251D56EB-2375-43B7-8104-DD7EC416D89A}" type="slidenum">
+              <a:rPr lang="en-US" smtClean="0"/>
+              <a:pPr/>
+              <a:t>16</a:t>
+            </a:fld>
+            <a:endParaRPr lang="en-US"/>
+          </a:p>
+        </p:txBody>
+      </p:sp>
+      <p:pic>
+        <p:nvPicPr>
+          <p:cNvPr id="5" name="Picture 4" descr="mpi-batch.jpeg"/>
+          <p:cNvPicPr>
+            <a:picLocks noChangeAspect="1"/>
+          </p:cNvPicPr>
+          <p:nvPr/>
+        </p:nvPicPr>
+        <p:blipFill>
+          <a:blip r:embed="rId2" cstate="print">
+            <a:extLst>
+              <a:ext uri="{28A0092B-C50C-407E-A947-70E740481C1C}">
+                <a14:useLocalDpi xmlns:a14="http://schemas.microsoft.com/office/drawing/2010/main" val="0"/>
+              </a:ext>
+            </a:extLst>
+          </a:blip>
+          <a:stretch>
+            <a:fillRect/>
+          </a:stretch>
+        </p:blipFill>
+        <p:spPr>
+          <a:xfrm>
+            <a:off x="0" y="1790700"/>
+            <a:ext cx="9144000" cy="3257078"/>
+          </a:xfrm>
+          <a:prstGeom prst="rect">
+            <a:avLst/>
+          </a:prstGeom>
+        </p:spPr>
+      </p:pic>
+    </p:spTree>
+    <p:extLst>
+      <p:ext uri="{BB962C8B-B14F-4D97-AF65-F5344CB8AC3E}">
+        <p14:creationId xmlns:p14="http://schemas.microsoft.com/office/powerpoint/2010/main" val="3589207903"/>
+      </p:ext>
+    </p:extLst>
+  </p:cSld>
+  <p:clrMapOvr>
+    <a:masterClrMapping/>
+  </p:clrMapOvr>
+</p:sld>
+</file>
+
+<file path=ppt/slides/slide17.xml><?xml version="1.0" encoding="utf-8"?>
+<p:sld xmlns:a="http://schemas.openxmlformats.org/drawingml/2006/main" xmlns:r="http://schemas.openxmlformats.org/officeDocument/2006/relationships" xmlns:p="http://schemas.openxmlformats.org/presentationml/2006/main">
+  <p:cSld>
+    <p:spTree>
+      <p:nvGrpSpPr>
+        <p:cNvPr id="1" name=""/>
+        <p:cNvGrpSpPr/>
+        <p:nvPr/>
+      </p:nvGrpSpPr>
+      <p:grpSpPr>
+        <a:xfrm>
+          <a:off x="0" y="0"/>
+          <a:ext cx="0" cy="0"/>
+          <a:chOff x="0" y="0"/>
+          <a:chExt cx="0" cy="0"/>
+        </a:xfrm>
+      </p:grpSpPr>
+      <p:sp>
+        <p:nvSpPr>
+          <p:cNvPr id="147458" name="Rectangle 2"/>
           <p:cNvSpPr>
             <a:spLocks noGrp="1" noChangeArrowheads="1"/>
           </p:cNvSpPr>
@@ -8056,7 +7921,7 @@
       </p:sp>
       <p:sp>
         <p:nvSpPr>
-          <p:cNvPr id="149507" name="Rectangle 3"/>
+          <p:cNvPr id="147459" name="Rectangle 3"/>
           <p:cNvSpPr>
             <a:spLocks noGrp="1" noChangeArrowheads="1"/>
           </p:cNvSpPr>
@@ -8066,7 +7931,7 @@
         </p:nvSpPr>
         <p:spPr>
           <a:xfrm>
-            <a:off x="457200" y="1264602"/>
+            <a:off x="457200" y="1264919"/>
             <a:ext cx="8229600" cy="4525963"/>
           </a:xfrm>
         </p:spPr>
@@ -8083,14 +7948,14 @@
             <a:pPr lvl="1"/>
             <a:r>
               <a:rPr lang="en-US" altLang="en-US" dirty="0"/>
-              <a:t>Fortran version</a:t>
-            </a:r>
-          </a:p>
-        </p:txBody>
-      </p:sp>
-      <p:sp>
-        <p:nvSpPr>
-          <p:cNvPr id="149508" name="Rectangle 4"/>
+              <a:t>C version</a:t>
+            </a:r>
+          </a:p>
+        </p:txBody>
+      </p:sp>
+      <p:sp>
+        <p:nvSpPr>
+          <p:cNvPr id="147460" name="Rectangle 4"/>
           <p:cNvSpPr>
             <a:spLocks noChangeArrowheads="1"/>
           </p:cNvSpPr>
@@ -8099,7 +7964,7 @@
         <p:spPr bwMode="auto">
           <a:xfrm>
             <a:off x="609600" y="2316162"/>
-            <a:ext cx="8032968" cy="2246769"/>
+            <a:ext cx="7620000" cy="2185214"/>
           </a:xfrm>
           <a:prstGeom prst="rect">
             <a:avLst/>
@@ -8114,7 +7979,7 @@
           <a:effectLst/>
         </p:spPr>
         <p:txBody>
-          <a:bodyPr wrap="none">
+          <a:bodyPr wrap="square">
             <a:spAutoFit/>
           </a:bodyPr>
           <a:lstStyle/>
@@ -8123,7 +7988,62 @@
               <a:rPr lang="en-US" altLang="en-US" sz="2000" dirty="0" smtClean="0">
                 <a:latin typeface="Courier New" pitchFamily="49" charset="0"/>
               </a:rPr>
-              <a:t>	 include '</a:t>
+              <a:t>	#</a:t>
+            </a:r>
+            <a:r>
+              <a:rPr lang="en-US" altLang="en-US" sz="2000" dirty="0">
+                <a:latin typeface="Courier New" pitchFamily="49" charset="0"/>
+              </a:rPr>
+              <a:t>include &lt;</a:t>
+            </a:r>
+            <a:r>
+              <a:rPr lang="en-US" altLang="en-US" sz="2000" b="1" dirty="0" err="1">
+                <a:solidFill>
+                  <a:srgbClr val="0070C0"/>
+                </a:solidFill>
+                <a:latin typeface="Courier New" pitchFamily="49" charset="0"/>
+              </a:rPr>
+              <a:t>mpi.h</a:t>
+            </a:r>
+            <a:r>
+              <a:rPr lang="en-US" altLang="en-US" sz="2000" dirty="0">
+                <a:latin typeface="Courier New" pitchFamily="49" charset="0"/>
+              </a:rPr>
+              <a:t>&gt;                      </a:t>
+            </a:r>
+          </a:p>
+          <a:p>
+            <a:r>
+              <a:rPr lang="en-US" altLang="en-US" sz="1600" dirty="0" smtClean="0">
+                <a:latin typeface="Courier New" pitchFamily="49" charset="0"/>
+              </a:rPr>
+              <a:t>	 </a:t>
+            </a:r>
+            <a:r>
+              <a:rPr lang="en-US" altLang="en-US" sz="2000" dirty="0" smtClean="0">
+                <a:latin typeface="Courier New" pitchFamily="49" charset="0"/>
+              </a:rPr>
+              <a:t>...</a:t>
+            </a:r>
+          </a:p>
+          <a:p>
+            <a:r>
+              <a:rPr lang="en-US" altLang="en-US" sz="2000" dirty="0" smtClean="0">
+                <a:latin typeface="Courier New" pitchFamily="49" charset="0"/>
+              </a:rPr>
+              <a:t>	</a:t>
+            </a:r>
+            <a:r>
+              <a:rPr lang="en-US" altLang="en-US" sz="2000" dirty="0" err="1" smtClean="0">
+                <a:latin typeface="Courier New" pitchFamily="49" charset="0"/>
+              </a:rPr>
+              <a:t>ierr</a:t>
+            </a:r>
+            <a:r>
+              <a:rPr lang="en-US" altLang="en-US" sz="2000" dirty="0" smtClean="0">
+                <a:latin typeface="Courier New" pitchFamily="49" charset="0"/>
+              </a:rPr>
+              <a:t>=</a:t>
             </a:r>
             <a:r>
               <a:rPr lang="en-US" altLang="en-US" sz="2000" b="1" dirty="0" err="1" smtClean="0">
@@ -8132,13 +8052,60 @@
                 </a:solidFill>
                 <a:latin typeface="Courier New" pitchFamily="49" charset="0"/>
               </a:rPr>
-              <a:t>mpif.h</a:t>
-            </a:r>
+              <a:t>MPI_Init</a:t>
+            </a:r>
+            <a:r>
+              <a:rPr lang="en-US" altLang="en-US" sz="2000" dirty="0">
+                <a:latin typeface="Courier New" pitchFamily="49" charset="0"/>
+              </a:rPr>
+              <a:t>(&amp;</a:t>
+            </a:r>
+            <a:r>
+              <a:rPr lang="en-US" altLang="en-US" sz="2000" dirty="0" err="1">
+                <a:latin typeface="Courier New" pitchFamily="49" charset="0"/>
+              </a:rPr>
+              <a:t>argc</a:t>
+            </a:r>
+            <a:r>
+              <a:rPr lang="en-US" altLang="en-US" sz="2000" dirty="0">
+                <a:latin typeface="Courier New" pitchFamily="49" charset="0"/>
+              </a:rPr>
+              <a:t>, &amp;</a:t>
+            </a:r>
+            <a:r>
+              <a:rPr lang="en-US" altLang="en-US" sz="2000" dirty="0" err="1">
+                <a:latin typeface="Courier New" pitchFamily="49" charset="0"/>
+              </a:rPr>
+              <a:t>argv</a:t>
+            </a:r>
+            <a:r>
+              <a:rPr lang="en-US" altLang="en-US" sz="2000" dirty="0">
+                <a:latin typeface="Courier New" pitchFamily="49" charset="0"/>
+              </a:rPr>
+              <a:t>);              </a:t>
+            </a:r>
+            <a:endParaRPr lang="en-US" altLang="en-US" sz="1600" dirty="0">
+              <a:latin typeface="Courier New" pitchFamily="49" charset="0"/>
+            </a:endParaRPr>
+          </a:p>
+          <a:p>
             <a:r>
               <a:rPr lang="en-US" altLang="en-US" sz="2000" dirty="0" smtClean="0">
                 <a:latin typeface="Courier New" pitchFamily="49" charset="0"/>
               </a:rPr>
-              <a:t>’		or    use </a:t>
+              <a:t>	</a:t>
+            </a:r>
+            <a:r>
+              <a:rPr lang="en-US" altLang="en-US" sz="2000" dirty="0" err="1" smtClean="0">
+                <a:latin typeface="Courier New" pitchFamily="49" charset="0"/>
+              </a:rPr>
+              <a:t>ierr</a:t>
+            </a:r>
+            <a:r>
+              <a:rPr lang="en-US" altLang="en-US" sz="2000" dirty="0" smtClean="0">
+                <a:latin typeface="Courier New" pitchFamily="49" charset="0"/>
+              </a:rPr>
+              <a:t>=</a:t>
             </a:r>
             <a:r>
               <a:rPr lang="en-US" altLang="en-US" sz="2000" b="1" dirty="0" err="1" smtClean="0">
@@ -8147,85 +8114,70 @@
                 </a:solidFill>
                 <a:latin typeface="Courier New" pitchFamily="49" charset="0"/>
               </a:rPr>
-              <a:t>mpi</a:t>
-            </a:r>
-            <a:endParaRPr lang="en-US" altLang="en-US" sz="2000" b="1" dirty="0">
-              <a:solidFill>
-                <a:srgbClr val="0070C0"/>
-              </a:solidFill>
-              <a:latin typeface="Courier New" pitchFamily="49" charset="0"/>
-            </a:endParaRPr>
-          </a:p>
-          <a:p>
+              <a:t>MPI_Comm_size</a:t>
+            </a:r>
             <a:r>
               <a:rPr lang="en-US" altLang="en-US" sz="2000" dirty="0" smtClean="0">
                 <a:latin typeface="Courier New" pitchFamily="49" charset="0"/>
               </a:rPr>
-              <a:t>	...</a:t>
-            </a:r>
-            <a:endParaRPr lang="en-US" altLang="en-US" sz="2000" dirty="0">
-              <a:latin typeface="Courier New" pitchFamily="49" charset="0"/>
-            </a:endParaRPr>
-          </a:p>
-          <a:p>
-            <a:r>
-              <a:rPr lang="en-US" altLang="en-US" sz="2000" dirty="0" smtClean="0">
-                <a:latin typeface="Courier New" pitchFamily="49" charset="0"/>
-              </a:rPr>
-              <a:t>	call </a:t>
-            </a:r>
-            <a:r>
-              <a:rPr lang="en-US" altLang="en-US" sz="2000" b="1" dirty="0" err="1">
+              <a:t>(</a:t>
+            </a:r>
+            <a:r>
+              <a:rPr lang="en-US" altLang="en-US" sz="2000" dirty="0" err="1" smtClean="0">
                 <a:solidFill>
                   <a:srgbClr val="0070C0"/>
                 </a:solidFill>
                 <a:latin typeface="Courier New" pitchFamily="49" charset="0"/>
               </a:rPr>
-              <a:t>MPI_Init</a:t>
+              <a:t>MPI_COMM_WORLD</a:t>
+            </a:r>
+            <a:r>
+              <a:rPr lang="en-US" altLang="en-US" sz="2000" dirty="0" err="1">
+                <a:latin typeface="Courier New" pitchFamily="49" charset="0"/>
+              </a:rPr>
+              <a:t>,&amp;npes</a:t>
             </a:r>
             <a:r>
               <a:rPr lang="en-US" altLang="en-US" sz="2000" dirty="0">
                 <a:latin typeface="Courier New" pitchFamily="49" charset="0"/>
               </a:rPr>
-              <a:t>(</a:t>
-            </a:r>
-            <a:r>
-              <a:rPr lang="en-US" altLang="en-US" sz="2000" dirty="0" err="1">
-                <a:latin typeface="Courier New" pitchFamily="49" charset="0"/>
-              </a:rPr>
-              <a:t>ierr</a:t>
-            </a:r>
-            <a:r>
-              <a:rPr lang="en-US" altLang="en-US" sz="2000" dirty="0">
-                <a:latin typeface="Courier New" pitchFamily="49" charset="0"/>
-              </a:rPr>
-              <a:t>)</a:t>
-            </a:r>
-          </a:p>
-          <a:p>
+              <a:t>); </a:t>
+            </a:r>
             <a:r>
               <a:rPr lang="en-US" altLang="en-US" sz="2000" dirty="0" smtClean="0">
                 <a:latin typeface="Courier New" pitchFamily="49" charset="0"/>
               </a:rPr>
-              <a:t>	call </a:t>
-            </a:r>
-            <a:r>
-              <a:rPr lang="en-US" altLang="en-US" sz="2000" b="1" dirty="0" err="1">
+              <a:t>	</a:t>
+            </a:r>
+            <a:r>
+              <a:rPr lang="en-US" altLang="en-US" sz="2000" dirty="0" err="1" smtClean="0">
+                <a:latin typeface="Courier New" pitchFamily="49" charset="0"/>
+              </a:rPr>
+              <a:t>ierr</a:t>
+            </a:r>
+            <a:r>
+              <a:rPr lang="en-US" altLang="en-US" sz="2000" dirty="0" smtClean="0">
+                <a:latin typeface="Courier New" pitchFamily="49" charset="0"/>
+              </a:rPr>
+              <a:t>=</a:t>
+            </a:r>
+            <a:r>
+              <a:rPr lang="en-US" altLang="en-US" sz="2000" b="1" dirty="0" err="1" smtClean="0">
                 <a:solidFill>
                   <a:srgbClr val="0070C0"/>
                 </a:solidFill>
                 <a:latin typeface="Courier New" pitchFamily="49" charset="0"/>
               </a:rPr>
-              <a:t>MPI_Comm_size</a:t>
-            </a:r>
-            <a:r>
-              <a:rPr lang="en-US" altLang="en-US" sz="2000" dirty="0">
+              <a:t>MPI_Comm_rank</a:t>
+            </a:r>
+            <a:r>
+              <a:rPr lang="en-US" altLang="en-US" sz="2000" dirty="0" smtClean="0">
                 <a:latin typeface="Courier New" pitchFamily="49" charset="0"/>
               </a:rPr>
               <a:t>(</a:t>
             </a:r>
             <a:r>
-              <a:rPr lang="en-US" altLang="en-US" sz="2000" dirty="0">
+              <a:rPr lang="en-US" altLang="en-US" sz="2000" dirty="0" err="1" smtClean="0">
                 <a:solidFill>
                   <a:srgbClr val="0070C0"/>
                 </a:solidFill>
@@ -8234,136 +8186,62 @@
               <a:t>MPI_COMM_WORLD</a:t>
             </a:r>
             <a:r>
+              <a:rPr lang="en-US" altLang="en-US" sz="2000" dirty="0" err="1">
+                <a:latin typeface="Courier New" pitchFamily="49" charset="0"/>
+              </a:rPr>
+              <a:t>,&amp;iam</a:t>
+            </a:r>
+            <a:r>
               <a:rPr lang="en-US" altLang="en-US" sz="2000" dirty="0">
                 <a:latin typeface="Courier New" pitchFamily="49" charset="0"/>
               </a:rPr>
-              <a:t>, </a:t>
+              <a:t>);</a:t>
+            </a:r>
+          </a:p>
+          <a:p>
+            <a:r>
+              <a:rPr lang="en-US" altLang="en-US" sz="1600" dirty="0" smtClean="0">
+                <a:latin typeface="Courier New" pitchFamily="49" charset="0"/>
+              </a:rPr>
+              <a:t>	...</a:t>
+            </a:r>
+            <a:endParaRPr lang="en-US" altLang="en-US" sz="1600" dirty="0">
+              <a:latin typeface="Courier New" pitchFamily="49" charset="0"/>
+            </a:endParaRPr>
+          </a:p>
+          <a:p>
+            <a:r>
+              <a:rPr lang="en-US" altLang="en-US" sz="2000" dirty="0" smtClean="0">
+                <a:latin typeface="Courier New" pitchFamily="49" charset="0"/>
+              </a:rPr>
+              <a:t>	</a:t>
             </a:r>
             <a:r>
               <a:rPr lang="en-US" altLang="en-US" sz="2000" dirty="0" err="1" smtClean="0">
                 <a:latin typeface="Courier New" pitchFamily="49" charset="0"/>
               </a:rPr>
-              <a:t>npes,ierr</a:t>
-            </a:r>
-            <a:r>
-              <a:rPr lang="en-US" altLang="en-US" sz="2000" dirty="0">
-                <a:latin typeface="Courier New" pitchFamily="49" charset="0"/>
-              </a:rPr>
-              <a:t>)</a:t>
-            </a:r>
-          </a:p>
-          <a:p>
+              <a:t>ierr</a:t>
+            </a:r>
             <a:r>
               <a:rPr lang="en-US" altLang="en-US" sz="2000" dirty="0" smtClean="0">
                 <a:latin typeface="Courier New" pitchFamily="49" charset="0"/>
               </a:rPr>
-              <a:t>	call </a:t>
-            </a:r>
-            <a:r>
-              <a:rPr lang="en-US" altLang="en-US" sz="2000" b="1" dirty="0" err="1">
+              <a:t>=</a:t>
+            </a:r>
+            <a:r>
+              <a:rPr lang="en-US" altLang="en-US" sz="2000" b="1" dirty="0" err="1" smtClean="0">
                 <a:solidFill>
                   <a:srgbClr val="0070C0"/>
                 </a:solidFill>
                 <a:latin typeface="Courier New" pitchFamily="49" charset="0"/>
               </a:rPr>
-              <a:t>MPI_Comm_rank</a:t>
+              <a:t>MPI_Finalize</a:t>
             </a:r>
             <a:r>
               <a:rPr lang="en-US" altLang="en-US" sz="2000" dirty="0">
                 <a:latin typeface="Courier New" pitchFamily="49" charset="0"/>
               </a:rPr>
-              <a:t>(</a:t>
-            </a:r>
-            <a:r>
-              <a:rPr lang="en-US" altLang="en-US" sz="2000" dirty="0">
-                <a:solidFill>
-                  <a:srgbClr val="0070C0"/>
-                </a:solidFill>
-                <a:latin typeface="Courier New" pitchFamily="49" charset="0"/>
-              </a:rPr>
-              <a:t>MPI_COMM_WORLD</a:t>
-            </a:r>
-            <a:r>
-              <a:rPr lang="en-US" altLang="en-US" sz="2000" dirty="0">
-                <a:latin typeface="Courier New" pitchFamily="49" charset="0"/>
-              </a:rPr>
-              <a:t>, </a:t>
-            </a:r>
-            <a:r>
-              <a:rPr lang="en-US" altLang="en-US" sz="2000" dirty="0" err="1">
-                <a:latin typeface="Courier New" pitchFamily="49" charset="0"/>
-              </a:rPr>
-              <a:t>iam</a:t>
-            </a:r>
-            <a:r>
-              <a:rPr lang="en-US" altLang="en-US" sz="2000" dirty="0">
-                <a:latin typeface="Courier New" pitchFamily="49" charset="0"/>
-              </a:rPr>
-              <a:t>, </a:t>
-            </a:r>
-            <a:r>
-              <a:rPr lang="en-US" altLang="en-US" sz="2000" dirty="0" err="1">
-                <a:latin typeface="Courier New" pitchFamily="49" charset="0"/>
-              </a:rPr>
-              <a:t>ierr</a:t>
-            </a:r>
-            <a:r>
-              <a:rPr lang="en-US" altLang="en-US" sz="2000" dirty="0">
-                <a:latin typeface="Courier New" pitchFamily="49" charset="0"/>
-              </a:rPr>
-              <a:t>)</a:t>
-            </a:r>
-          </a:p>
-          <a:p>
-            <a:r>
-              <a:rPr lang="en-US" altLang="en-US" sz="2000" dirty="0">
-                <a:latin typeface="Courier New" pitchFamily="49" charset="0"/>
-              </a:rPr>
-              <a:t>    </a:t>
-            </a:r>
-            <a:r>
-              <a:rPr lang="en-US" altLang="en-US" sz="2000" dirty="0" smtClean="0">
-                <a:latin typeface="Courier New" pitchFamily="49" charset="0"/>
-              </a:rPr>
-              <a:t>	...</a:t>
-            </a:r>
-            <a:endParaRPr lang="en-US" altLang="en-US" sz="2000" dirty="0">
-              <a:latin typeface="Courier New" pitchFamily="49" charset="0"/>
-            </a:endParaRPr>
-          </a:p>
-          <a:p>
-            <a:r>
-              <a:rPr lang="en-US" altLang="en-US" sz="2000" dirty="0" smtClean="0">
-                <a:latin typeface="Courier New" pitchFamily="49" charset="0"/>
-              </a:rPr>
-              <a:t>	call </a:t>
-            </a:r>
-            <a:r>
-              <a:rPr lang="en-US" altLang="en-US" sz="2000" b="1" dirty="0" err="1">
-                <a:solidFill>
-                  <a:srgbClr val="0070C0"/>
-                </a:solidFill>
-                <a:latin typeface="Courier New" pitchFamily="49" charset="0"/>
-              </a:rPr>
-              <a:t>MPI_Finalize</a:t>
-            </a:r>
-            <a:r>
-              <a:rPr lang="en-US" altLang="en-US" sz="2000" dirty="0">
-                <a:latin typeface="Courier New" pitchFamily="49" charset="0"/>
-              </a:rPr>
-              <a:t>(</a:t>
-            </a:r>
-            <a:r>
-              <a:rPr lang="en-US" altLang="en-US" sz="2000" dirty="0" err="1">
-                <a:latin typeface="Courier New" pitchFamily="49" charset="0"/>
-              </a:rPr>
-              <a:t>ierr</a:t>
-            </a:r>
-            <a:r>
-              <a:rPr lang="en-US" altLang="en-US" sz="2000" dirty="0">
-                <a:latin typeface="Courier New" pitchFamily="49" charset="0"/>
-              </a:rPr>
-              <a:t>)</a:t>
+              <a:t>();</a:t>
             </a:r>
             <a:endParaRPr lang="en-US" altLang="en-US" sz="2400" dirty="0">
               <a:latin typeface="Courier New" pitchFamily="49" charset="0"/>
@@ -8373,7 +8251,7 @@
       </p:sp>
       <p:sp>
         <p:nvSpPr>
-          <p:cNvPr id="149509" name="Rectangle 5"/>
+          <p:cNvPr id="147461" name="Rectangle 5"/>
           <p:cNvSpPr>
             <a:spLocks noChangeArrowheads="1"/>
           </p:cNvSpPr>
@@ -8381,7 +8259,7 @@
         </p:nvSpPr>
         <p:spPr bwMode="auto">
           <a:xfrm>
-            <a:off x="685800" y="4830762"/>
+            <a:off x="609600" y="4602162"/>
             <a:ext cx="7543800" cy="1143000"/>
           </a:xfrm>
           <a:prstGeom prst="rect">
@@ -8401,13 +8279,13 @@
           <a:lstStyle/>
           <a:p>
             <a:r>
-              <a:rPr lang="en-US" altLang="en-US" sz="2800" b="0">
+              <a:rPr lang="en-US" altLang="en-US" sz="2800" b="0" dirty="0">
                 <a:solidFill>
                   <a:schemeClr val="tx1"/>
                 </a:solidFill>
                 <a:latin typeface="Helvetica" pitchFamily="34" charset="0"/>
               </a:rPr>
-              <a:t>In Fortran, MPI routines are subroutines with the last parameter as the error value</a:t>
+              <a:t>In C MPI routines are functions which return the error value</a:t>
             </a:r>
           </a:p>
         </p:txBody>
@@ -8427,7 +8305,424 @@
 </p:sld>
 </file>
 
-<file path=ppt/slides/slide17.xml><?xml version="1.0" encoding="utf-8"?>
+<file path=ppt/slides/slide18.xml><?xml version="1.0" encoding="utf-8"?>
+<p:sld xmlns:a="http://schemas.openxmlformats.org/drawingml/2006/main" xmlns:r="http://schemas.openxmlformats.org/officeDocument/2006/relationships" xmlns:p="http://schemas.openxmlformats.org/presentationml/2006/main">
+  <p:cSld>
+    <p:spTree>
+      <p:nvGrpSpPr>
+        <p:cNvPr id="1" name=""/>
+        <p:cNvGrpSpPr/>
+        <p:nvPr/>
+      </p:nvGrpSpPr>
+      <p:grpSpPr>
+        <a:xfrm>
+          <a:off x="0" y="0"/>
+          <a:ext cx="0" cy="0"/>
+          <a:chOff x="0" y="0"/>
+          <a:chExt cx="0" cy="0"/>
+        </a:xfrm>
+      </p:grpSpPr>
+      <p:sp>
+        <p:nvSpPr>
+          <p:cNvPr id="149506" name="Rectangle 2"/>
+          <p:cNvSpPr>
+            <a:spLocks noGrp="1" noChangeArrowheads="1"/>
+          </p:cNvSpPr>
+          <p:nvPr>
+            <p:ph type="title"/>
+          </p:nvPr>
+        </p:nvSpPr>
+        <p:spPr>
+          <a:xfrm>
+            <a:off x="457200" y="0"/>
+            <a:ext cx="8229600" cy="1143000"/>
+          </a:xfrm>
+        </p:spPr>
+        <p:txBody>
+          <a:bodyPr/>
+          <a:lstStyle/>
+          <a:p>
+            <a:r>
+              <a:rPr lang="en-US" altLang="en-US" dirty="0"/>
+              <a:t>Minimal MPI program</a:t>
+            </a:r>
+          </a:p>
+        </p:txBody>
+      </p:sp>
+      <p:sp>
+        <p:nvSpPr>
+          <p:cNvPr id="149507" name="Rectangle 3"/>
+          <p:cNvSpPr>
+            <a:spLocks noGrp="1" noChangeArrowheads="1"/>
+          </p:cNvSpPr>
+          <p:nvPr>
+            <p:ph type="body" idx="1"/>
+          </p:nvPr>
+        </p:nvSpPr>
+        <p:spPr>
+          <a:xfrm>
+            <a:off x="457200" y="1264602"/>
+            <a:ext cx="8229600" cy="4525963"/>
+          </a:xfrm>
+        </p:spPr>
+        <p:txBody>
+          <a:bodyPr/>
+          <a:lstStyle/>
+          <a:p>
+            <a:r>
+              <a:rPr lang="en-US" altLang="en-US" dirty="0"/>
+              <a:t> Every MPI program needs these…</a:t>
+            </a:r>
+          </a:p>
+          <a:p>
+            <a:pPr lvl="1"/>
+            <a:r>
+              <a:rPr lang="en-US" altLang="en-US" dirty="0"/>
+              <a:t>Fortran version</a:t>
+            </a:r>
+          </a:p>
+        </p:txBody>
+      </p:sp>
+      <p:sp>
+        <p:nvSpPr>
+          <p:cNvPr id="149508" name="Rectangle 4"/>
+          <p:cNvSpPr>
+            <a:spLocks noChangeArrowheads="1"/>
+          </p:cNvSpPr>
+          <p:nvPr/>
+        </p:nvSpPr>
+        <p:spPr bwMode="auto">
+          <a:xfrm>
+            <a:off x="609600" y="2316162"/>
+            <a:ext cx="8032968" cy="2246769"/>
+          </a:xfrm>
+          <a:prstGeom prst="rect">
+            <a:avLst/>
+          </a:prstGeom>
+          <a:noFill/>
+          <a:ln w="9525">
+            <a:noFill/>
+            <a:miter lim="800000"/>
+            <a:headEnd/>
+            <a:tailEnd/>
+          </a:ln>
+          <a:effectLst/>
+        </p:spPr>
+        <p:txBody>
+          <a:bodyPr wrap="none">
+            <a:spAutoFit/>
+          </a:bodyPr>
+          <a:lstStyle/>
+          <a:p>
+            <a:r>
+              <a:rPr lang="en-US" altLang="en-US" sz="2000" dirty="0" smtClean="0">
+                <a:latin typeface="Courier New" pitchFamily="49" charset="0"/>
+              </a:rPr>
+              <a:t>	 include '</a:t>
+            </a:r>
+            <a:r>
+              <a:rPr lang="en-US" altLang="en-US" sz="2000" b="1" dirty="0" err="1" smtClean="0">
+                <a:solidFill>
+                  <a:srgbClr val="0070C0"/>
+                </a:solidFill>
+                <a:latin typeface="Courier New" pitchFamily="49" charset="0"/>
+              </a:rPr>
+              <a:t>mpif.h</a:t>
+            </a:r>
+            <a:r>
+              <a:rPr lang="en-US" altLang="en-US" sz="2000" dirty="0" smtClean="0">
+                <a:latin typeface="Courier New" pitchFamily="49" charset="0"/>
+              </a:rPr>
+              <a:t>’		or    use </a:t>
+            </a:r>
+            <a:r>
+              <a:rPr lang="en-US" altLang="en-US" sz="2000" b="1" dirty="0" err="1" smtClean="0">
+                <a:solidFill>
+                  <a:srgbClr val="0070C0"/>
+                </a:solidFill>
+                <a:latin typeface="Courier New" pitchFamily="49" charset="0"/>
+              </a:rPr>
+              <a:t>mpi</a:t>
+            </a:r>
+            <a:endParaRPr lang="en-US" altLang="en-US" sz="2000" b="1" dirty="0">
+              <a:solidFill>
+                <a:srgbClr val="0070C0"/>
+              </a:solidFill>
+              <a:latin typeface="Courier New" pitchFamily="49" charset="0"/>
+            </a:endParaRPr>
+          </a:p>
+          <a:p>
+            <a:r>
+              <a:rPr lang="en-US" altLang="en-US" sz="2000" dirty="0" smtClean="0">
+                <a:latin typeface="Courier New" pitchFamily="49" charset="0"/>
+              </a:rPr>
+              <a:t>	...</a:t>
+            </a:r>
+            <a:endParaRPr lang="en-US" altLang="en-US" sz="2000" dirty="0">
+              <a:latin typeface="Courier New" pitchFamily="49" charset="0"/>
+            </a:endParaRPr>
+          </a:p>
+          <a:p>
+            <a:r>
+              <a:rPr lang="en-US" altLang="en-US" sz="2000" dirty="0" smtClean="0">
+                <a:latin typeface="Courier New" pitchFamily="49" charset="0"/>
+              </a:rPr>
+              <a:t>	call </a:t>
+            </a:r>
+            <a:r>
+              <a:rPr lang="en-US" altLang="en-US" sz="2000" b="1" dirty="0" err="1">
+                <a:solidFill>
+                  <a:srgbClr val="0070C0"/>
+                </a:solidFill>
+                <a:latin typeface="Courier New" pitchFamily="49" charset="0"/>
+              </a:rPr>
+              <a:t>MPI_Init</a:t>
+            </a:r>
+            <a:r>
+              <a:rPr lang="en-US" altLang="en-US" sz="2000" dirty="0">
+                <a:latin typeface="Courier New" pitchFamily="49" charset="0"/>
+              </a:rPr>
+              <a:t>(</a:t>
+            </a:r>
+            <a:r>
+              <a:rPr lang="en-US" altLang="en-US" sz="2000" dirty="0" err="1">
+                <a:latin typeface="Courier New" pitchFamily="49" charset="0"/>
+              </a:rPr>
+              <a:t>ierr</a:t>
+            </a:r>
+            <a:r>
+              <a:rPr lang="en-US" altLang="en-US" sz="2000" dirty="0">
+                <a:latin typeface="Courier New" pitchFamily="49" charset="0"/>
+              </a:rPr>
+              <a:t>)</a:t>
+            </a:r>
+          </a:p>
+          <a:p>
+            <a:r>
+              <a:rPr lang="en-US" altLang="en-US" sz="2000" dirty="0" smtClean="0">
+                <a:latin typeface="Courier New" pitchFamily="49" charset="0"/>
+              </a:rPr>
+              <a:t>	call </a:t>
+            </a:r>
+            <a:r>
+              <a:rPr lang="en-US" altLang="en-US" sz="2000" b="1" dirty="0" err="1">
+                <a:solidFill>
+                  <a:srgbClr val="0070C0"/>
+                </a:solidFill>
+                <a:latin typeface="Courier New" pitchFamily="49" charset="0"/>
+              </a:rPr>
+              <a:t>MPI_Comm_size</a:t>
+            </a:r>
+            <a:r>
+              <a:rPr lang="en-US" altLang="en-US" sz="2000" dirty="0">
+                <a:latin typeface="Courier New" pitchFamily="49" charset="0"/>
+              </a:rPr>
+              <a:t>(</a:t>
+            </a:r>
+            <a:r>
+              <a:rPr lang="en-US" altLang="en-US" sz="2000" dirty="0">
+                <a:solidFill>
+                  <a:srgbClr val="0070C0"/>
+                </a:solidFill>
+                <a:latin typeface="Courier New" pitchFamily="49" charset="0"/>
+              </a:rPr>
+              <a:t>MPI_COMM_WORLD</a:t>
+            </a:r>
+            <a:r>
+              <a:rPr lang="en-US" altLang="en-US" sz="2000" dirty="0">
+                <a:latin typeface="Courier New" pitchFamily="49" charset="0"/>
+              </a:rPr>
+              <a:t>, </a:t>
+            </a:r>
+            <a:r>
+              <a:rPr lang="en-US" altLang="en-US" sz="2000" dirty="0" err="1" smtClean="0">
+                <a:latin typeface="Courier New" pitchFamily="49" charset="0"/>
+              </a:rPr>
+              <a:t>npes,ierr</a:t>
+            </a:r>
+            <a:r>
+              <a:rPr lang="en-US" altLang="en-US" sz="2000" dirty="0">
+                <a:latin typeface="Courier New" pitchFamily="49" charset="0"/>
+              </a:rPr>
+              <a:t>)</a:t>
+            </a:r>
+          </a:p>
+          <a:p>
+            <a:r>
+              <a:rPr lang="en-US" altLang="en-US" sz="2000" dirty="0" smtClean="0">
+                <a:latin typeface="Courier New" pitchFamily="49" charset="0"/>
+              </a:rPr>
+              <a:t>	call </a:t>
+            </a:r>
+            <a:r>
+              <a:rPr lang="en-US" altLang="en-US" sz="2000" b="1" dirty="0" err="1">
+                <a:solidFill>
+                  <a:srgbClr val="0070C0"/>
+                </a:solidFill>
+                <a:latin typeface="Courier New" pitchFamily="49" charset="0"/>
+              </a:rPr>
+              <a:t>MPI_Comm_rank</a:t>
+            </a:r>
+            <a:r>
+              <a:rPr lang="en-US" altLang="en-US" sz="2000" dirty="0">
+                <a:latin typeface="Courier New" pitchFamily="49" charset="0"/>
+              </a:rPr>
+              <a:t>(</a:t>
+            </a:r>
+            <a:r>
+              <a:rPr lang="en-US" altLang="en-US" sz="2000" dirty="0">
+                <a:solidFill>
+                  <a:srgbClr val="0070C0"/>
+                </a:solidFill>
+                <a:latin typeface="Courier New" pitchFamily="49" charset="0"/>
+              </a:rPr>
+              <a:t>MPI_COMM_WORLD</a:t>
+            </a:r>
+            <a:r>
+              <a:rPr lang="en-US" altLang="en-US" sz="2000" dirty="0">
+                <a:latin typeface="Courier New" pitchFamily="49" charset="0"/>
+              </a:rPr>
+              <a:t>, </a:t>
+            </a:r>
+            <a:r>
+              <a:rPr lang="en-US" altLang="en-US" sz="2000" dirty="0" err="1">
+                <a:latin typeface="Courier New" pitchFamily="49" charset="0"/>
+              </a:rPr>
+              <a:t>iam</a:t>
+            </a:r>
+            <a:r>
+              <a:rPr lang="en-US" altLang="en-US" sz="2000" dirty="0">
+                <a:latin typeface="Courier New" pitchFamily="49" charset="0"/>
+              </a:rPr>
+              <a:t>, </a:t>
+            </a:r>
+            <a:r>
+              <a:rPr lang="en-US" altLang="en-US" sz="2000" dirty="0" err="1">
+                <a:latin typeface="Courier New" pitchFamily="49" charset="0"/>
+              </a:rPr>
+              <a:t>ierr</a:t>
+            </a:r>
+            <a:r>
+              <a:rPr lang="en-US" altLang="en-US" sz="2000" dirty="0">
+                <a:latin typeface="Courier New" pitchFamily="49" charset="0"/>
+              </a:rPr>
+              <a:t>)</a:t>
+            </a:r>
+          </a:p>
+          <a:p>
+            <a:r>
+              <a:rPr lang="en-US" altLang="en-US" sz="2000" dirty="0">
+                <a:latin typeface="Courier New" pitchFamily="49" charset="0"/>
+              </a:rPr>
+              <a:t>    </a:t>
+            </a:r>
+            <a:r>
+              <a:rPr lang="en-US" altLang="en-US" sz="2000" dirty="0" smtClean="0">
+                <a:latin typeface="Courier New" pitchFamily="49" charset="0"/>
+              </a:rPr>
+              <a:t>	...</a:t>
+            </a:r>
+            <a:endParaRPr lang="en-US" altLang="en-US" sz="2000" dirty="0">
+              <a:latin typeface="Courier New" pitchFamily="49" charset="0"/>
+            </a:endParaRPr>
+          </a:p>
+          <a:p>
+            <a:r>
+              <a:rPr lang="en-US" altLang="en-US" sz="2000" dirty="0" smtClean="0">
+                <a:latin typeface="Courier New" pitchFamily="49" charset="0"/>
+              </a:rPr>
+              <a:t>	call </a:t>
+            </a:r>
+            <a:r>
+              <a:rPr lang="en-US" altLang="en-US" sz="2000" b="1" dirty="0" err="1">
+                <a:solidFill>
+                  <a:srgbClr val="0070C0"/>
+                </a:solidFill>
+                <a:latin typeface="Courier New" pitchFamily="49" charset="0"/>
+              </a:rPr>
+              <a:t>MPI_Finalize</a:t>
+            </a:r>
+            <a:r>
+              <a:rPr lang="en-US" altLang="en-US" sz="2000" dirty="0">
+                <a:latin typeface="Courier New" pitchFamily="49" charset="0"/>
+              </a:rPr>
+              <a:t>(</a:t>
+            </a:r>
+            <a:r>
+              <a:rPr lang="en-US" altLang="en-US" sz="2000" dirty="0" err="1">
+                <a:latin typeface="Courier New" pitchFamily="49" charset="0"/>
+              </a:rPr>
+              <a:t>ierr</a:t>
+            </a:r>
+            <a:r>
+              <a:rPr lang="en-US" altLang="en-US" sz="2000" dirty="0">
+                <a:latin typeface="Courier New" pitchFamily="49" charset="0"/>
+              </a:rPr>
+              <a:t>)</a:t>
+            </a:r>
+            <a:endParaRPr lang="en-US" altLang="en-US" sz="2400" dirty="0">
+              <a:latin typeface="Courier New" pitchFamily="49" charset="0"/>
+            </a:endParaRPr>
+          </a:p>
+        </p:txBody>
+      </p:sp>
+      <p:sp>
+        <p:nvSpPr>
+          <p:cNvPr id="149509" name="Rectangle 5"/>
+          <p:cNvSpPr>
+            <a:spLocks noChangeArrowheads="1"/>
+          </p:cNvSpPr>
+          <p:nvPr/>
+        </p:nvSpPr>
+        <p:spPr bwMode="auto">
+          <a:xfrm>
+            <a:off x="685800" y="4830762"/>
+            <a:ext cx="7543800" cy="1143000"/>
+          </a:xfrm>
+          <a:prstGeom prst="rect">
+            <a:avLst/>
+          </a:prstGeom>
+          <a:noFill/>
+          <a:ln w="9525">
+            <a:noFill/>
+            <a:miter lim="800000"/>
+            <a:headEnd/>
+            <a:tailEnd/>
+          </a:ln>
+          <a:effectLst/>
+        </p:spPr>
+        <p:txBody>
+          <a:bodyPr/>
+          <a:lstStyle/>
+          <a:p>
+            <a:r>
+              <a:rPr lang="en-US" altLang="en-US" sz="2800" b="0">
+                <a:solidFill>
+                  <a:schemeClr val="tx1"/>
+                </a:solidFill>
+                <a:latin typeface="Helvetica" pitchFamily="34" charset="0"/>
+              </a:rPr>
+              <a:t>In Fortran, MPI routines are subroutines with the last parameter as the error value</a:t>
+            </a:r>
+          </a:p>
+        </p:txBody>
+      </p:sp>
+    </p:spTree>
+  </p:cSld>
+  <p:clrMapOvr>
+    <a:masterClrMapping/>
+  </p:clrMapOvr>
+  <p:timing>
+    <p:tnLst>
+      <p:par>
+        <p:cTn xmlns:p14="http://schemas.microsoft.com/office/powerpoint/2010/main" id="1" dur="indefinite" restart="never" nodeType="tmRoot"/>
+      </p:par>
+    </p:tnLst>
+  </p:timing>
+</p:sld>
+</file>
+
+<file path=ppt/slides/slide19.xml><?xml version="1.0" encoding="utf-8"?>
 <p:sld xmlns:a="http://schemas.openxmlformats.org/drawingml/2006/main" xmlns:r="http://schemas.openxmlformats.org/officeDocument/2006/relationships" xmlns:p="http://schemas.openxmlformats.org/presentationml/2006/main">
   <p:cSld>
     <p:spTree>
@@ -9108,11 +9403,17 @@
           <p:cNvGraphicFramePr>
             <a:graphicFrameLocks noGrp="1"/>
           </p:cNvGraphicFramePr>
-          <p:nvPr/>
+          <p:nvPr>
+            <p:extLst>
+              <p:ext uri="{D42A27DB-BD31-4B8C-83A1-F6EECF244321}">
+                <p14:modId xmlns:p14="http://schemas.microsoft.com/office/powerpoint/2010/main" val="2649328257"/>
+              </p:ext>
+            </p:extLst>
+          </p:nvPr>
         </p:nvGraphicFramePr>
         <p:xfrm>
-          <a:off x="1143000" y="2895600"/>
-          <a:ext cx="6324600" cy="742950"/>
+          <a:off x="1066800" y="3048000"/>
+          <a:ext cx="6324600" cy="737235"/>
         </p:xfrm>
         <a:graphic>
           <a:graphicData uri="http://schemas.openxmlformats.org/drawingml/2006/table">
@@ -9123,7 +9424,7 @@
                 <a:gridCol w="2108200"/>
                 <a:gridCol w="2108200"/>
               </a:tblGrid>
-              <a:tr h="371475">
+              <a:tr h="219075">
                 <a:tc>
                   <a:txBody>
                     <a:bodyPr/>
@@ -9146,7 +9447,7 @@
                         <a:tabLst/>
                       </a:pPr>
                       <a:r>
-                        <a:rPr kumimoji="0" lang="en-US" sz="1800" b="1" i="0" u="none" strike="noStrike" cap="none" normalizeH="0" baseline="0" smtClean="0">
+                        <a:rPr kumimoji="0" lang="en-US" sz="1800" b="1" i="0" u="none" strike="noStrike" cap="none" normalizeH="0" baseline="0" dirty="0" smtClean="0">
                           <a:ln>
                             <a:noFill/>
                           </a:ln>
@@ -9513,7 +9814,7 @@
                         <a:tabLst/>
                       </a:pPr>
                       <a:r>
-                        <a:rPr kumimoji="0" lang="en-US" sz="1800" b="0" i="0" u="none" strike="noStrike" cap="none" normalizeH="0" baseline="0" smtClean="0">
+                        <a:rPr kumimoji="0" lang="en-US" sz="1800" b="0" i="0" u="none" strike="noStrike" cap="none" normalizeH="0" baseline="0" dirty="0" smtClean="0">
                           <a:ln>
                             <a:noFill/>
                           </a:ln>
@@ -9524,7 +9825,35 @@
                           <a:latin typeface="Calibri" pitchFamily="-112" charset="0"/>
                           <a:ea typeface="ＭＳ Ｐゴシック" pitchFamily="-112" charset="-128"/>
                         </a:rPr>
-                        <a:t>#include &lt;mpi.h&gt;</a:t>
+                        <a:t>#include &lt;</a:t>
+                      </a:r>
+                      <a:r>
+                        <a:rPr kumimoji="0" lang="en-US" sz="1800" b="0" i="0" u="none" strike="noStrike" cap="none" normalizeH="0" baseline="0" dirty="0" err="1" smtClean="0">
+                          <a:ln>
+                            <a:noFill/>
+                          </a:ln>
+                          <a:solidFill>
+                            <a:srgbClr val="000000"/>
+                          </a:solidFill>
+                          <a:effectLst/>
+                          <a:latin typeface="Calibri" pitchFamily="-112" charset="0"/>
+                          <a:ea typeface="ＭＳ Ｐゴシック" pitchFamily="-112" charset="-128"/>
+                        </a:rPr>
+                        <a:t>mpi.h</a:t>
+                      </a:r>
+                      <a:r>
+                        <a:rPr kumimoji="0" lang="en-US" sz="1800" b="0" i="0" u="none" strike="noStrike" cap="none" normalizeH="0" baseline="0" dirty="0" smtClean="0">
+                          <a:ln>
+                            <a:noFill/>
+                          </a:ln>
+                          <a:solidFill>
+                            <a:srgbClr val="000000"/>
+                          </a:solidFill>
+                          <a:effectLst/>
+                          <a:latin typeface="Calibri" pitchFamily="-112" charset="0"/>
+                          <a:ea typeface="ＭＳ Ｐゴシック" pitchFamily="-112" charset="-128"/>
+                        </a:rPr>
+                        <a:t>&gt;</a:t>
                       </a:r>
                     </a:p>
                   </a:txBody>
@@ -9575,10 +9904,16 @@
           <p:cNvGraphicFramePr>
             <a:graphicFrameLocks noGrp="1"/>
           </p:cNvGraphicFramePr>
-          <p:nvPr/>
+          <p:nvPr>
+            <p:extLst>
+              <p:ext uri="{D42A27DB-BD31-4B8C-83A1-F6EECF244321}">
+                <p14:modId xmlns:p14="http://schemas.microsoft.com/office/powerpoint/2010/main" val="2033301494"/>
+              </p:ext>
+            </p:extLst>
+          </p:nvPr>
         </p:nvGraphicFramePr>
         <p:xfrm>
-          <a:off x="1143000" y="4267200"/>
+          <a:off x="1066800" y="4495800"/>
           <a:ext cx="7239000" cy="742950"/>
         </p:xfrm>
         <a:graphic>
@@ -10034,784 +10369,6 @@
 </p:sld>
 </file>
 
-<file path=ppt/slides/slide18.xml><?xml version="1.0" encoding="utf-8"?>
-<p:sld xmlns:a="http://schemas.openxmlformats.org/drawingml/2006/main" xmlns:r="http://schemas.openxmlformats.org/officeDocument/2006/relationships" xmlns:p="http://schemas.openxmlformats.org/presentationml/2006/main">
-  <p:cSld>
-    <p:spTree>
-      <p:nvGrpSpPr>
-        <p:cNvPr id="1" name=""/>
-        <p:cNvGrpSpPr/>
-        <p:nvPr/>
-      </p:nvGrpSpPr>
-      <p:grpSpPr>
-        <a:xfrm>
-          <a:off x="0" y="0"/>
-          <a:ext cx="0" cy="0"/>
-          <a:chOff x="0" y="0"/>
-          <a:chExt cx="0" cy="0"/>
-        </a:xfrm>
-      </p:grpSpPr>
-      <p:sp>
-        <p:nvSpPr>
-          <p:cNvPr id="6" name="Title 5"/>
-          <p:cNvSpPr>
-            <a:spLocks noGrp="1"/>
-          </p:cNvSpPr>
-          <p:nvPr>
-            <p:ph type="title"/>
-          </p:nvPr>
-        </p:nvSpPr>
-        <p:spPr>
-          <a:xfrm>
-            <a:off x="457200" y="0"/>
-            <a:ext cx="8229600" cy="1143000"/>
-          </a:xfrm>
-        </p:spPr>
-        <p:txBody>
-          <a:bodyPr/>
-          <a:lstStyle/>
-          <a:p>
-            <a:r>
-              <a:rPr lang="en-US" dirty="0" smtClean="0"/>
-              <a:t>Run Parameters</a:t>
-            </a:r>
-            <a:endParaRPr lang="en-US" dirty="0"/>
-          </a:p>
-        </p:txBody>
-      </p:sp>
-      <p:sp>
-        <p:nvSpPr>
-          <p:cNvPr id="7" name="Rectangle 2"/>
-          <p:cNvSpPr>
-            <a:spLocks noGrp="1" noChangeArrowheads="1"/>
-          </p:cNvSpPr>
-          <p:nvPr>
-            <p:ph idx="1"/>
-          </p:nvPr>
-        </p:nvSpPr>
-        <p:spPr>
-          <a:xfrm>
-            <a:off x="685800" y="1447800"/>
-            <a:ext cx="8458200" cy="4702175"/>
-          </a:xfrm>
-        </p:spPr>
-        <p:txBody>
-          <a:bodyPr/>
-          <a:lstStyle/>
-          <a:p>
-            <a:pPr marL="341313" indent="-341313">
-              <a:lnSpc>
-                <a:spcPct val="60000"/>
-              </a:lnSpc>
-              <a:spcBef>
-                <a:spcPts val="1250"/>
-              </a:spcBef>
-              <a:buClr>
-                <a:schemeClr val="tx1"/>
-              </a:buClr>
-              <a:buFont typeface="Courier New" pitchFamily="-112" charset="0"/>
-              <a:buChar char="•"/>
-              <a:tabLst>
-                <a:tab pos="911225" algn="l"/>
-                <a:tab pos="1825625" algn="l"/>
-                <a:tab pos="2740025" algn="l"/>
-                <a:tab pos="3654425" algn="l"/>
-                <a:tab pos="4568825" algn="l"/>
-                <a:tab pos="5483225" algn="l"/>
-                <a:tab pos="6397625" algn="l"/>
-                <a:tab pos="7312025" algn="l"/>
-                <a:tab pos="8226425" algn="l"/>
-                <a:tab pos="9140825" algn="l"/>
-                <a:tab pos="10055225" algn="l"/>
-              </a:tabLst>
-            </a:pPr>
-            <a:r>
-              <a:rPr lang="en-US" sz="2000" b="1" dirty="0" err="1" smtClean="0">
-                <a:solidFill>
-                  <a:srgbClr val="0000FF"/>
-                </a:solidFill>
-                <a:latin typeface="Andale Mono" pitchFamily="-112" charset="0"/>
-                <a:ea typeface="ＭＳ Ｐゴシック" pitchFamily="-112" charset="-128"/>
-              </a:rPr>
-              <a:t>MPI_Comm_size</a:t>
-            </a:r>
-            <a:r>
-              <a:rPr lang="en-US" sz="2000" b="1" dirty="0" smtClean="0">
-                <a:solidFill>
-                  <a:srgbClr val="800000"/>
-                </a:solidFill>
-                <a:latin typeface="Andale Mono" pitchFamily="-112" charset="0"/>
-                <a:ea typeface="ＭＳ Ｐゴシック" pitchFamily="-112" charset="-128"/>
-              </a:rPr>
-              <a:t> </a:t>
-            </a:r>
-            <a:r>
-              <a:rPr lang="en-US" sz="2000" b="1" dirty="0" smtClean="0">
-                <a:latin typeface="Andale Mono" pitchFamily="-112" charset="0"/>
-                <a:ea typeface="ＭＳ Ｐゴシック" pitchFamily="-112" charset="-128"/>
-              </a:rPr>
-              <a:t>:</a:t>
-            </a:r>
-            <a:r>
-              <a:rPr lang="en-US" sz="2000" b="1" dirty="0" smtClean="0">
-                <a:solidFill>
-                  <a:srgbClr val="800000"/>
-                </a:solidFill>
-                <a:latin typeface="Andale Mono" pitchFamily="-112" charset="0"/>
-                <a:ea typeface="ＭＳ Ｐゴシック" pitchFamily="-112" charset="-128"/>
-              </a:rPr>
-              <a:t>   </a:t>
-            </a:r>
-            <a:r>
-              <a:rPr lang="en-US" sz="2000" dirty="0" smtClean="0">
-                <a:ea typeface="ＭＳ Ｐゴシック" pitchFamily="-112" charset="-128"/>
-              </a:rPr>
-              <a:t>gets the number of processes in a run</a:t>
-            </a:r>
-            <a:endParaRPr lang="en-US" sz="1600" dirty="0" smtClean="0">
-              <a:ea typeface="ＭＳ Ｐゴシック" pitchFamily="-112" charset="-128"/>
-            </a:endParaRPr>
-          </a:p>
-          <a:p>
-            <a:pPr marL="341313" indent="-341313" eaLnBrk="1" hangingPunct="1">
-              <a:lnSpc>
-                <a:spcPct val="60000"/>
-              </a:lnSpc>
-              <a:spcBef>
-                <a:spcPts val="1250"/>
-              </a:spcBef>
-              <a:buClr>
-                <a:schemeClr val="tx1"/>
-              </a:buClr>
-              <a:buFont typeface="Arial" charset="0"/>
-              <a:buNone/>
-              <a:tabLst>
-                <a:tab pos="911225" algn="l"/>
-                <a:tab pos="1825625" algn="l"/>
-                <a:tab pos="2740025" algn="l"/>
-                <a:tab pos="3654425" algn="l"/>
-                <a:tab pos="4568825" algn="l"/>
-                <a:tab pos="5483225" algn="l"/>
-                <a:tab pos="6397625" algn="l"/>
-                <a:tab pos="7312025" algn="l"/>
-                <a:tab pos="8226425" algn="l"/>
-                <a:tab pos="9140825" algn="l"/>
-                <a:tab pos="10055225" algn="l"/>
-              </a:tabLst>
-            </a:pPr>
-            <a:r>
-              <a:rPr lang="en-US" sz="1600" dirty="0" smtClean="0">
-                <a:ea typeface="ＭＳ Ｐゴシック" pitchFamily="-112" charset="-128"/>
-              </a:rPr>
-              <a:t>			</a:t>
-            </a:r>
-            <a:r>
-              <a:rPr lang="en-US" sz="2000" dirty="0" smtClean="0">
-                <a:ea typeface="ＭＳ Ｐゴシック" pitchFamily="-112" charset="-128"/>
-              </a:rPr>
-              <a:t>	Integer</a:t>
-            </a:r>
-          </a:p>
-          <a:p>
-            <a:pPr marL="341313" indent="-341313" eaLnBrk="1" hangingPunct="1">
-              <a:lnSpc>
-                <a:spcPct val="60000"/>
-              </a:lnSpc>
-              <a:spcBef>
-                <a:spcPts val="1250"/>
-              </a:spcBef>
-              <a:buClr>
-                <a:schemeClr val="tx1"/>
-              </a:buClr>
-              <a:buFont typeface="Arial" charset="0"/>
-              <a:buNone/>
-              <a:tabLst>
-                <a:tab pos="911225" algn="l"/>
-                <a:tab pos="1825625" algn="l"/>
-                <a:tab pos="2740025" algn="l"/>
-                <a:tab pos="3654425" algn="l"/>
-                <a:tab pos="4568825" algn="l"/>
-                <a:tab pos="5483225" algn="l"/>
-                <a:tab pos="6397625" algn="l"/>
-                <a:tab pos="7312025" algn="l"/>
-                <a:tab pos="8226425" algn="l"/>
-                <a:tab pos="9140825" algn="l"/>
-                <a:tab pos="10055225" algn="l"/>
-              </a:tabLst>
-            </a:pPr>
-            <a:r>
-              <a:rPr lang="en-US" sz="1600" dirty="0" smtClean="0">
-                <a:ea typeface="ＭＳ Ｐゴシック" pitchFamily="-112" charset="-128"/>
-              </a:rPr>
-              <a:t>				</a:t>
-            </a:r>
-            <a:r>
-              <a:rPr lang="en-US" sz="2000" dirty="0" smtClean="0">
-                <a:ea typeface="ＭＳ Ｐゴシック" pitchFamily="-112" charset="-128"/>
-              </a:rPr>
-              <a:t>(typically called just after </a:t>
-            </a:r>
-            <a:r>
-              <a:rPr lang="en-US" sz="2000" b="1" dirty="0" err="1" smtClean="0">
-                <a:solidFill>
-                  <a:srgbClr val="800000"/>
-                </a:solidFill>
-                <a:latin typeface="Andale Mono" pitchFamily="-112" charset="0"/>
-                <a:ea typeface="ＭＳ Ｐゴシック" pitchFamily="-112" charset="-128"/>
-              </a:rPr>
-              <a:t>MPI_Init</a:t>
-            </a:r>
-            <a:r>
-              <a:rPr lang="en-US" sz="2000" dirty="0" smtClean="0">
-                <a:ea typeface="ＭＳ Ｐゴシック" pitchFamily="-112" charset="-128"/>
-              </a:rPr>
-              <a:t>).</a:t>
-            </a:r>
-          </a:p>
-          <a:p>
-            <a:pPr marL="341313" indent="-341313" eaLnBrk="1" hangingPunct="1">
-              <a:spcBef>
-                <a:spcPts val="1250"/>
-              </a:spcBef>
-              <a:buClr>
-                <a:schemeClr val="tx1"/>
-              </a:buClr>
-              <a:buFont typeface="Courier New" pitchFamily="-112" charset="0"/>
-              <a:buChar char="•"/>
-              <a:tabLst>
-                <a:tab pos="911225" algn="l"/>
-                <a:tab pos="1825625" algn="l"/>
-                <a:tab pos="2740025" algn="l"/>
-                <a:tab pos="3654425" algn="l"/>
-                <a:tab pos="4568825" algn="l"/>
-                <a:tab pos="5483225" algn="l"/>
-                <a:tab pos="6397625" algn="l"/>
-                <a:tab pos="7312025" algn="l"/>
-                <a:tab pos="8226425" algn="l"/>
-                <a:tab pos="9140825" algn="l"/>
-                <a:tab pos="10055225" algn="l"/>
-              </a:tabLst>
-            </a:pPr>
-            <a:r>
-              <a:rPr lang="en-US" sz="2000" b="1" dirty="0" err="1" smtClean="0">
-                <a:solidFill>
-                  <a:srgbClr val="0000FF"/>
-                </a:solidFill>
-                <a:latin typeface="Andale Mono" pitchFamily="-112" charset="0"/>
-                <a:ea typeface="ＭＳ Ｐゴシック" pitchFamily="-112" charset="-128"/>
-              </a:rPr>
-              <a:t>MPI_Comm_rank</a:t>
-            </a:r>
-            <a:r>
-              <a:rPr lang="en-US" sz="2000" b="1" dirty="0" smtClean="0">
-                <a:solidFill>
-                  <a:srgbClr val="800000"/>
-                </a:solidFill>
-                <a:latin typeface="Andale Mono" pitchFamily="-112" charset="0"/>
-                <a:ea typeface="ＭＳ Ｐゴシック" pitchFamily="-112" charset="-128"/>
-              </a:rPr>
-              <a:t> </a:t>
-            </a:r>
-            <a:r>
-              <a:rPr lang="en-US" sz="2000" b="1" dirty="0" smtClean="0">
-                <a:solidFill>
-                  <a:srgbClr val="000000"/>
-                </a:solidFill>
-                <a:latin typeface="Andale Mono" pitchFamily="-112" charset="0"/>
-                <a:ea typeface="ＭＳ Ｐゴシック" pitchFamily="-112" charset="-128"/>
-              </a:rPr>
-              <a:t>:</a:t>
-            </a:r>
-            <a:r>
-              <a:rPr lang="en-US" sz="2000" b="1" dirty="0" smtClean="0">
-                <a:solidFill>
-                  <a:srgbClr val="800000"/>
-                </a:solidFill>
-                <a:latin typeface="Andale Mono" pitchFamily="-112" charset="0"/>
-                <a:ea typeface="ＭＳ Ｐゴシック" pitchFamily="-112" charset="-128"/>
-              </a:rPr>
-              <a:t>   </a:t>
-            </a:r>
-            <a:r>
-              <a:rPr lang="en-US" sz="2000" dirty="0" smtClean="0">
-                <a:ea typeface="ＭＳ Ｐゴシック" pitchFamily="-112" charset="-128"/>
-              </a:rPr>
-              <a:t>gets the process ID  (rank) of the current process, 			integer between 0 and </a:t>
-            </a:r>
-            <a:r>
-              <a:rPr lang="en-US" sz="2000" i="1" dirty="0" smtClean="0">
-                <a:ea typeface="ＭＳ Ｐゴシック" pitchFamily="-112" charset="-128"/>
-              </a:rPr>
-              <a:t>NP</a:t>
-            </a:r>
-            <a:r>
-              <a:rPr lang="en-US" sz="2000" dirty="0" smtClean="0">
-                <a:ea typeface="ＭＳ Ｐゴシック" pitchFamily="-112" charset="-128"/>
-              </a:rPr>
-              <a:t>-1 inclusive </a:t>
-            </a:r>
-          </a:p>
-          <a:p>
-            <a:pPr marL="341313" indent="-341313" eaLnBrk="1" hangingPunct="1">
-              <a:lnSpc>
-                <a:spcPct val="60000"/>
-              </a:lnSpc>
-              <a:spcBef>
-                <a:spcPts val="1250"/>
-              </a:spcBef>
-              <a:buClr>
-                <a:schemeClr val="tx1"/>
-              </a:buClr>
-              <a:buFont typeface="Arial" charset="0"/>
-              <a:buNone/>
-              <a:tabLst>
-                <a:tab pos="911225" algn="l"/>
-                <a:tab pos="1825625" algn="l"/>
-                <a:tab pos="2740025" algn="l"/>
-                <a:tab pos="3654425" algn="l"/>
-                <a:tab pos="4568825" algn="l"/>
-                <a:tab pos="5483225" algn="l"/>
-                <a:tab pos="6397625" algn="l"/>
-                <a:tab pos="7312025" algn="l"/>
-                <a:tab pos="8226425" algn="l"/>
-                <a:tab pos="9140825" algn="l"/>
-                <a:tab pos="10055225" algn="l"/>
-              </a:tabLst>
-            </a:pPr>
-            <a:r>
-              <a:rPr lang="en-US" sz="2000" dirty="0" smtClean="0">
-                <a:ea typeface="ＭＳ Ｐゴシック" pitchFamily="-112" charset="-128"/>
-              </a:rPr>
-              <a:t>				(typically called just after </a:t>
-            </a:r>
-            <a:r>
-              <a:rPr lang="en-US" sz="2000" b="1" dirty="0" err="1" smtClean="0">
-                <a:solidFill>
-                  <a:srgbClr val="800000"/>
-                </a:solidFill>
-                <a:latin typeface="Andale Mono" pitchFamily="-112" charset="0"/>
-                <a:ea typeface="ＭＳ Ｐゴシック" pitchFamily="-112" charset="-128"/>
-              </a:rPr>
-              <a:t>MPI_Init</a:t>
-            </a:r>
-            <a:r>
-              <a:rPr lang="en-US" sz="2000" dirty="0" smtClean="0">
-                <a:ea typeface="ＭＳ Ｐゴシック" pitchFamily="-112" charset="-128"/>
-              </a:rPr>
-              <a:t>).</a:t>
-            </a:r>
-          </a:p>
-        </p:txBody>
-      </p:sp>
-    </p:spTree>
-  </p:cSld>
-  <p:clrMapOvr>
-    <a:masterClrMapping/>
-  </p:clrMapOvr>
-  <p:timing>
-    <p:tnLst>
-      <p:par>
-        <p:cTn xmlns:p14="http://schemas.microsoft.com/office/powerpoint/2010/main" id="1" dur="indefinite" restart="never" nodeType="tmRoot"/>
-      </p:par>
-    </p:tnLst>
-  </p:timing>
-</p:sld>
-</file>
-
-<file path=ppt/slides/slide19.xml><?xml version="1.0" encoding="utf-8"?>
-<p:sld xmlns:a="http://schemas.openxmlformats.org/drawingml/2006/main" xmlns:r="http://schemas.openxmlformats.org/officeDocument/2006/relationships" xmlns:p="http://schemas.openxmlformats.org/presentationml/2006/main">
-  <p:cSld>
-    <p:spTree>
-      <p:nvGrpSpPr>
-        <p:cNvPr id="1" name=""/>
-        <p:cNvGrpSpPr/>
-        <p:nvPr/>
-      </p:nvGrpSpPr>
-      <p:grpSpPr>
-        <a:xfrm>
-          <a:off x="0" y="0"/>
-          <a:ext cx="0" cy="0"/>
-          <a:chOff x="0" y="0"/>
-          <a:chExt cx="0" cy="0"/>
-        </a:xfrm>
-      </p:grpSpPr>
-      <p:sp>
-        <p:nvSpPr>
-          <p:cNvPr id="143362" name="Rectangle 2"/>
-          <p:cNvSpPr>
-            <a:spLocks noGrp="1" noChangeArrowheads="1"/>
-          </p:cNvSpPr>
-          <p:nvPr>
-            <p:ph type="title"/>
-          </p:nvPr>
-        </p:nvSpPr>
-        <p:spPr>
-          <a:xfrm>
-            <a:off x="457200" y="0"/>
-            <a:ext cx="8229600" cy="1143000"/>
-          </a:xfrm>
-        </p:spPr>
-        <p:txBody>
-          <a:bodyPr/>
-          <a:lstStyle/>
-          <a:p>
-            <a:r>
-              <a:rPr lang="en-US" altLang="en-US" dirty="0"/>
-              <a:t>Communicators</a:t>
-            </a:r>
-          </a:p>
-        </p:txBody>
-      </p:sp>
-      <p:sp>
-        <p:nvSpPr>
-          <p:cNvPr id="143363" name="Rectangle 3"/>
-          <p:cNvSpPr>
-            <a:spLocks noGrp="1" noChangeArrowheads="1"/>
-          </p:cNvSpPr>
-          <p:nvPr>
-            <p:ph type="body" idx="1"/>
-          </p:nvPr>
-        </p:nvSpPr>
-        <p:spPr>
-          <a:xfrm>
-            <a:off x="457200" y="1143000"/>
-            <a:ext cx="8686800" cy="5029200"/>
-          </a:xfrm>
-        </p:spPr>
-        <p:txBody>
-          <a:bodyPr>
-            <a:normAutofit fontScale="92500"/>
-          </a:bodyPr>
-          <a:lstStyle/>
-          <a:p>
-            <a:r>
-              <a:rPr lang="en-US" altLang="en-US" sz="3000" dirty="0"/>
-              <a:t>Communicators</a:t>
-            </a:r>
-          </a:p>
-          <a:p>
-            <a:pPr lvl="1"/>
-            <a:r>
-              <a:rPr lang="en-US" sz="2600" dirty="0" smtClean="0">
-                <a:ea typeface="굴림" pitchFamily="-112" charset="-127"/>
-              </a:rPr>
-              <a:t>MPI uses a communicator objects (and groups) to identify a </a:t>
-            </a:r>
-            <a:r>
-              <a:rPr lang="en-US" sz="2600" dirty="0" smtClean="0">
-                <a:solidFill>
-                  <a:srgbClr val="0070C0"/>
-                </a:solidFill>
-                <a:ea typeface="굴림" pitchFamily="-112" charset="-127"/>
-              </a:rPr>
-              <a:t>set of processes which communicate only within their set</a:t>
-            </a:r>
-            <a:r>
-              <a:rPr lang="en-US" sz="2600" dirty="0" smtClean="0">
-                <a:ea typeface="굴림" pitchFamily="-112" charset="-127"/>
-              </a:rPr>
-              <a:t>.</a:t>
-            </a:r>
-          </a:p>
-          <a:p>
-            <a:pPr lvl="1"/>
-            <a:r>
-              <a:rPr lang="en-US" altLang="en-US" sz="2600" dirty="0" smtClean="0"/>
-              <a:t>MPI_COMM_WORLD </a:t>
-            </a:r>
-            <a:r>
-              <a:rPr lang="en-US" altLang="en-US" sz="2600" dirty="0"/>
-              <a:t>is defined in the MPI include file as </a:t>
-            </a:r>
-            <a:r>
-              <a:rPr lang="en-US" altLang="en-US" sz="2600" dirty="0" smtClean="0"/>
-              <a:t/>
-            </a:r>
-            <a:br>
-              <a:rPr lang="en-US" altLang="en-US" sz="2600" dirty="0" smtClean="0"/>
-            </a:br>
-            <a:r>
-              <a:rPr lang="en-US" altLang="en-US" sz="2600" dirty="0" smtClean="0">
-                <a:solidFill>
-                  <a:srgbClr val="0070C0"/>
-                </a:solidFill>
-              </a:rPr>
-              <a:t>all processes</a:t>
-            </a:r>
-            <a:r>
-              <a:rPr lang="en-US" altLang="en-US" sz="2600" dirty="0" smtClean="0"/>
-              <a:t> (ranks) of </a:t>
-            </a:r>
-            <a:r>
-              <a:rPr lang="en-US" altLang="en-US" sz="2600" dirty="0"/>
-              <a:t>your job</a:t>
-            </a:r>
-          </a:p>
-          <a:p>
-            <a:pPr lvl="1"/>
-            <a:r>
-              <a:rPr lang="en-US" altLang="en-US" sz="2600" dirty="0">
-                <a:solidFill>
-                  <a:srgbClr val="0070C0"/>
-                </a:solidFill>
-              </a:rPr>
-              <a:t>R</a:t>
-            </a:r>
-            <a:r>
-              <a:rPr lang="en-US" altLang="en-US" sz="2600" dirty="0" smtClean="0">
-                <a:solidFill>
-                  <a:srgbClr val="0070C0"/>
-                </a:solidFill>
-              </a:rPr>
-              <a:t>equired</a:t>
-            </a:r>
-            <a:r>
-              <a:rPr lang="en-US" altLang="en-US" sz="2600" dirty="0" smtClean="0"/>
-              <a:t> </a:t>
-            </a:r>
-            <a:r>
-              <a:rPr lang="en-US" altLang="en-US" sz="2600" dirty="0"/>
-              <a:t>parameter </a:t>
-            </a:r>
-            <a:r>
-              <a:rPr lang="en-US" altLang="en-US" sz="2600" dirty="0">
-                <a:solidFill>
-                  <a:srgbClr val="0070C0"/>
-                </a:solidFill>
-              </a:rPr>
-              <a:t>for most MPI calls</a:t>
-            </a:r>
-          </a:p>
-          <a:p>
-            <a:pPr lvl="1"/>
-            <a:r>
-              <a:rPr lang="en-US" altLang="en-US" sz="2600" dirty="0"/>
-              <a:t>Y</a:t>
-            </a:r>
-            <a:r>
-              <a:rPr lang="en-US" altLang="en-US" sz="2600" dirty="0" smtClean="0"/>
-              <a:t>ou </a:t>
-            </a:r>
-            <a:r>
-              <a:rPr lang="en-US" altLang="en-US" sz="2600" dirty="0">
-                <a:solidFill>
-                  <a:srgbClr val="0070C0"/>
-                </a:solidFill>
-              </a:rPr>
-              <a:t>can create subsets</a:t>
-            </a:r>
-            <a:r>
-              <a:rPr lang="en-US" altLang="en-US" sz="2600" dirty="0"/>
-              <a:t> of MPI_COMM_WORLD</a:t>
-            </a:r>
-          </a:p>
-          <a:p>
-            <a:pPr marL="341313" indent="-341313">
-              <a:lnSpc>
-                <a:spcPct val="80000"/>
-              </a:lnSpc>
-              <a:spcBef>
-                <a:spcPts val="1125"/>
-              </a:spcBef>
-              <a:tabLst>
-                <a:tab pos="911225" algn="l"/>
-                <a:tab pos="1825625" algn="l"/>
-                <a:tab pos="2740025" algn="l"/>
-                <a:tab pos="3654425" algn="l"/>
-                <a:tab pos="4568825" algn="l"/>
-                <a:tab pos="5483225" algn="l"/>
-                <a:tab pos="6397625" algn="l"/>
-                <a:tab pos="7312025" algn="l"/>
-                <a:tab pos="8226425" algn="l"/>
-                <a:tab pos="9140825" algn="l"/>
-                <a:tab pos="10055225" algn="l"/>
-              </a:tabLst>
-            </a:pPr>
-            <a:r>
-              <a:rPr lang="en-US" sz="2600" dirty="0" smtClean="0">
-                <a:ea typeface="굴림" pitchFamily="-112" charset="-127"/>
-              </a:rPr>
-              <a:t>Rank</a:t>
-            </a:r>
-          </a:p>
-          <a:p>
-            <a:pPr marL="741363" lvl="1" indent="-284163">
-              <a:lnSpc>
-                <a:spcPct val="80000"/>
-              </a:lnSpc>
-              <a:spcBef>
-                <a:spcPts val="400"/>
-              </a:spcBef>
-              <a:tabLst>
-                <a:tab pos="911225" algn="l"/>
-                <a:tab pos="1825625" algn="l"/>
-                <a:tab pos="2740025" algn="l"/>
-                <a:tab pos="3654425" algn="l"/>
-                <a:tab pos="4568825" algn="l"/>
-                <a:tab pos="5483225" algn="l"/>
-                <a:tab pos="6397625" algn="l"/>
-                <a:tab pos="7312025" algn="l"/>
-                <a:tab pos="8226425" algn="l"/>
-                <a:tab pos="9140825" algn="l"/>
-                <a:tab pos="10055225" algn="l"/>
-              </a:tabLst>
-            </a:pPr>
-            <a:r>
-              <a:rPr lang="en-US" sz="2200" dirty="0" smtClean="0">
-                <a:ea typeface="굴림" pitchFamily="-112" charset="-127"/>
-              </a:rPr>
-              <a:t>Unique </a:t>
-            </a:r>
-            <a:r>
-              <a:rPr lang="en-US" sz="2200" i="1" dirty="0" smtClean="0">
-                <a:solidFill>
-                  <a:srgbClr val="0070C0"/>
-                </a:solidFill>
-                <a:ea typeface="굴림" pitchFamily="-112" charset="-127"/>
-              </a:rPr>
-              <a:t>process ID</a:t>
-            </a:r>
-            <a:r>
-              <a:rPr lang="en-US" sz="2200" dirty="0" smtClean="0">
-                <a:ea typeface="굴림" pitchFamily="-112" charset="-127"/>
-              </a:rPr>
-              <a:t> within a communicator</a:t>
-            </a:r>
-          </a:p>
-          <a:p>
-            <a:pPr marL="741363" lvl="1" indent="-284163">
-              <a:lnSpc>
-                <a:spcPct val="80000"/>
-              </a:lnSpc>
-              <a:spcBef>
-                <a:spcPts val="400"/>
-              </a:spcBef>
-              <a:tabLst>
-                <a:tab pos="911225" algn="l"/>
-                <a:tab pos="1825625" algn="l"/>
-                <a:tab pos="2740025" algn="l"/>
-                <a:tab pos="3654425" algn="l"/>
-                <a:tab pos="4568825" algn="l"/>
-                <a:tab pos="5483225" algn="l"/>
-                <a:tab pos="6397625" algn="l"/>
-                <a:tab pos="7312025" algn="l"/>
-                <a:tab pos="8226425" algn="l"/>
-                <a:tab pos="9140825" algn="l"/>
-                <a:tab pos="10055225" algn="l"/>
-              </a:tabLst>
-            </a:pPr>
-            <a:r>
-              <a:rPr lang="en-US" sz="2200" dirty="0" smtClean="0">
-                <a:ea typeface="굴림" pitchFamily="-112" charset="-127"/>
-              </a:rPr>
-              <a:t>Assigned by the system when the process initializes </a:t>
-            </a:r>
-            <a:r>
-              <a:rPr lang="en-US" sz="1500" dirty="0" smtClean="0">
-                <a:ea typeface="굴림" pitchFamily="-112" charset="-127"/>
-              </a:rPr>
-              <a:t>(for MPI_COMM_WORLD)</a:t>
-            </a:r>
-            <a:endParaRPr lang="en-US" sz="2200" dirty="0" smtClean="0">
-              <a:ea typeface="굴림" pitchFamily="-112" charset="-127"/>
-            </a:endParaRPr>
-          </a:p>
-          <a:p>
-            <a:pPr marL="741363" lvl="1" indent="-284163">
-              <a:lnSpc>
-                <a:spcPct val="80000"/>
-              </a:lnSpc>
-              <a:spcBef>
-                <a:spcPts val="400"/>
-              </a:spcBef>
-              <a:tabLst>
-                <a:tab pos="911225" algn="l"/>
-                <a:tab pos="1825625" algn="l"/>
-                <a:tab pos="2740025" algn="l"/>
-                <a:tab pos="3654425" algn="l"/>
-                <a:tab pos="4568825" algn="l"/>
-                <a:tab pos="5483225" algn="l"/>
-                <a:tab pos="6397625" algn="l"/>
-                <a:tab pos="7312025" algn="l"/>
-                <a:tab pos="8226425" algn="l"/>
-                <a:tab pos="9140825" algn="l"/>
-                <a:tab pos="10055225" algn="l"/>
-              </a:tabLst>
-            </a:pPr>
-            <a:r>
-              <a:rPr lang="en-US" altLang="en-US" sz="2200" dirty="0" smtClean="0"/>
-              <a:t>Processors within a communicator are assigned numbers </a:t>
-            </a:r>
-            <a:r>
-              <a:rPr lang="en-US" altLang="en-US" sz="2200" dirty="0" smtClean="0">
-                <a:solidFill>
-                  <a:srgbClr val="0070C0"/>
-                </a:solidFill>
-              </a:rPr>
-              <a:t>0 to n-1</a:t>
-            </a:r>
-            <a:r>
-              <a:rPr lang="en-US" altLang="en-US" sz="2200" dirty="0" smtClean="0"/>
-              <a:t> (C/F90)</a:t>
-            </a:r>
-          </a:p>
-          <a:p>
-            <a:pPr marL="741363" lvl="1" indent="-284163">
-              <a:lnSpc>
-                <a:spcPct val="80000"/>
-              </a:lnSpc>
-              <a:spcBef>
-                <a:spcPts val="400"/>
-              </a:spcBef>
-              <a:tabLst>
-                <a:tab pos="911225" algn="l"/>
-                <a:tab pos="1825625" algn="l"/>
-                <a:tab pos="2740025" algn="l"/>
-                <a:tab pos="3654425" algn="l"/>
-                <a:tab pos="4568825" algn="l"/>
-                <a:tab pos="5483225" algn="l"/>
-                <a:tab pos="6397625" algn="l"/>
-                <a:tab pos="7312025" algn="l"/>
-                <a:tab pos="8226425" algn="l"/>
-                <a:tab pos="9140825" algn="l"/>
-                <a:tab pos="10055225" algn="l"/>
-              </a:tabLst>
-            </a:pPr>
-            <a:r>
-              <a:rPr lang="en-US" sz="2200" dirty="0" smtClean="0">
-                <a:ea typeface="굴림" pitchFamily="-112" charset="-127"/>
-              </a:rPr>
-              <a:t>Used to specify sources and destinations of messages, </a:t>
-            </a:r>
-            <a:br>
-              <a:rPr lang="en-US" sz="2200" dirty="0" smtClean="0">
-                <a:ea typeface="굴림" pitchFamily="-112" charset="-127"/>
-              </a:rPr>
-            </a:br>
-            <a:r>
-              <a:rPr lang="en-US" sz="2200" dirty="0" smtClean="0">
-                <a:ea typeface="굴림" pitchFamily="-112" charset="-127"/>
-              </a:rPr>
-              <a:t>process specific indexing and operations.</a:t>
-            </a:r>
-          </a:p>
-        </p:txBody>
-      </p:sp>
-    </p:spTree>
-  </p:cSld>
-  <p:clrMapOvr>
-    <a:masterClrMapping/>
-  </p:clrMapOvr>
-  <p:timing>
-    <p:tnLst>
-      <p:par>
-        <p:cTn xmlns:p14="http://schemas.microsoft.com/office/powerpoint/2010/main" id="1" dur="indefinite" restart="never" nodeType="tmRoot"/>
-      </p:par>
-    </p:tnLst>
-  </p:timing>
-</p:sld>
-</file>
-
 <file path=ppt/slides/slide2.xml><?xml version="1.0" encoding="utf-8"?>
 <p:sld xmlns:a="http://schemas.openxmlformats.org/drawingml/2006/main" xmlns:r="http://schemas.openxmlformats.org/officeDocument/2006/relationships" xmlns:p="http://schemas.openxmlformats.org/presentationml/2006/main">
   <p:cSld>
@@ -10973,287 +10530,353 @@
       </p:grpSpPr>
       <p:sp>
         <p:nvSpPr>
-          <p:cNvPr id="141314" name="Rectangle 2"/>
+          <p:cNvPr id="6" name="Title 5"/>
+          <p:cNvSpPr>
+            <a:spLocks noGrp="1"/>
+          </p:cNvSpPr>
+          <p:nvPr>
+            <p:ph type="title"/>
+          </p:nvPr>
+        </p:nvSpPr>
+        <p:spPr>
+          <a:xfrm>
+            <a:off x="457200" y="0"/>
+            <a:ext cx="8229600" cy="1143000"/>
+          </a:xfrm>
+        </p:spPr>
+        <p:txBody>
+          <a:bodyPr/>
+          <a:lstStyle/>
+          <a:p>
+            <a:r>
+              <a:rPr lang="en-US" dirty="0" smtClean="0"/>
+              <a:t>Run Parameters</a:t>
+            </a:r>
+            <a:endParaRPr lang="en-US" dirty="0"/>
+          </a:p>
+        </p:txBody>
+      </p:sp>
+      <p:sp>
+        <p:nvSpPr>
+          <p:cNvPr id="7" name="Rectangle 2"/>
           <p:cNvSpPr>
             <a:spLocks noGrp="1" noChangeArrowheads="1"/>
           </p:cNvSpPr>
           <p:nvPr>
-            <p:ph type="title"/>
+            <p:ph idx="1"/>
           </p:nvPr>
         </p:nvSpPr>
         <p:spPr>
           <a:xfrm>
-            <a:off x="457200" y="0"/>
-            <a:ext cx="8229600" cy="1143000"/>
+            <a:off x="685800" y="1447800"/>
+            <a:ext cx="8458200" cy="4702175"/>
           </a:xfrm>
         </p:spPr>
         <p:txBody>
           <a:bodyPr/>
           <a:lstStyle/>
           <a:p>
-            <a:r>
-              <a:rPr lang="en-US" altLang="en-US" dirty="0"/>
-              <a:t>Include files</a:t>
-            </a:r>
-          </a:p>
-        </p:txBody>
-      </p:sp>
-      <p:sp>
-        <p:nvSpPr>
-          <p:cNvPr id="141315" name="Rectangle 3"/>
-          <p:cNvSpPr>
-            <a:spLocks noGrp="1" noChangeArrowheads="1"/>
-          </p:cNvSpPr>
-          <p:nvPr>
-            <p:ph type="body" idx="1"/>
-          </p:nvPr>
-        </p:nvSpPr>
-        <p:spPr>
-          <a:xfrm>
-            <a:off x="685800" y="1066800"/>
-            <a:ext cx="7772400" cy="4876800"/>
-          </a:xfrm>
-        </p:spPr>
-        <p:txBody>
-          <a:bodyPr>
-            <a:normAutofit fontScale="85000" lnSpcReduction="10000"/>
-          </a:bodyPr>
-          <a:lstStyle/>
-          <a:p>
-            <a:pPr>
+            <a:pPr marL="341313" indent="-341313">
               <a:lnSpc>
-                <a:spcPct val="90000"/>
+                <a:spcPct val="60000"/>
               </a:lnSpc>
+              <a:spcBef>
+                <a:spcPts val="1250"/>
+              </a:spcBef>
+              <a:buClr>
+                <a:schemeClr val="tx1"/>
+              </a:buClr>
+              <a:buFont typeface="Courier New" pitchFamily="-112" charset="0"/>
+              <a:buChar char="•"/>
+              <a:tabLst>
+                <a:tab pos="911225" algn="l"/>
+                <a:tab pos="1825625" algn="l"/>
+                <a:tab pos="2740025" algn="l"/>
+                <a:tab pos="3654425" algn="l"/>
+                <a:tab pos="4568825" algn="l"/>
+                <a:tab pos="5483225" algn="l"/>
+                <a:tab pos="6397625" algn="l"/>
+                <a:tab pos="7312025" algn="l"/>
+                <a:tab pos="8226425" algn="l"/>
+                <a:tab pos="9140825" algn="l"/>
+                <a:tab pos="10055225" algn="l"/>
+              </a:tabLst>
             </a:pPr>
             <a:r>
-              <a:rPr lang="en-US" altLang="en-US" dirty="0"/>
-              <a:t>The MPI include file</a:t>
-            </a:r>
-          </a:p>
-          <a:p>
-            <a:pPr lvl="1">
+              <a:rPr lang="en-US" sz="2000" b="1" dirty="0" err="1" smtClean="0">
+                <a:solidFill>
+                  <a:srgbClr val="0000FF"/>
+                </a:solidFill>
+                <a:latin typeface="Andale Mono" pitchFamily="-112" charset="0"/>
+                <a:ea typeface="ＭＳ Ｐゴシック" pitchFamily="-112" charset="-128"/>
+              </a:rPr>
+              <a:t>MPI_Comm_size</a:t>
+            </a:r>
+            <a:r>
+              <a:rPr lang="en-US" sz="2000" b="1" dirty="0" smtClean="0">
+                <a:solidFill>
+                  <a:srgbClr val="800000"/>
+                </a:solidFill>
+                <a:latin typeface="Andale Mono" pitchFamily="-112" charset="0"/>
+                <a:ea typeface="ＭＳ Ｐゴシック" pitchFamily="-112" charset="-128"/>
+              </a:rPr>
+              <a:t> </a:t>
+            </a:r>
+            <a:r>
+              <a:rPr lang="en-US" sz="2000" b="1" dirty="0" smtClean="0">
+                <a:latin typeface="Andale Mono" pitchFamily="-112" charset="0"/>
+                <a:ea typeface="ＭＳ Ｐゴシック" pitchFamily="-112" charset="-128"/>
+              </a:rPr>
+              <a:t>:</a:t>
+            </a:r>
+            <a:r>
+              <a:rPr lang="en-US" sz="2000" b="1" dirty="0" smtClean="0">
+                <a:solidFill>
+                  <a:srgbClr val="800000"/>
+                </a:solidFill>
+                <a:latin typeface="Andale Mono" pitchFamily="-112" charset="0"/>
+                <a:ea typeface="ＭＳ Ｐゴシック" pitchFamily="-112" charset="-128"/>
+              </a:rPr>
+              <a:t>   </a:t>
+            </a:r>
+            <a:r>
+              <a:rPr lang="en-US" sz="2000" dirty="0" smtClean="0">
+                <a:ea typeface="ＭＳ Ｐゴシック" pitchFamily="-112" charset="-128"/>
+              </a:rPr>
+              <a:t>gets the number of processes in a run</a:t>
+            </a:r>
+            <a:endParaRPr lang="en-US" sz="1600" dirty="0" smtClean="0">
+              <a:ea typeface="ＭＳ Ｐゴシック" pitchFamily="-112" charset="-128"/>
+            </a:endParaRPr>
+          </a:p>
+          <a:p>
+            <a:pPr marL="341313" indent="-341313" eaLnBrk="1" hangingPunct="1">
               <a:lnSpc>
-                <a:spcPct val="90000"/>
+                <a:spcPct val="60000"/>
               </a:lnSpc>
+              <a:spcBef>
+                <a:spcPts val="1250"/>
+              </a:spcBef>
+              <a:buClr>
+                <a:schemeClr val="tx1"/>
+              </a:buClr>
+              <a:buFont typeface="Arial" charset="0"/>
+              <a:buNone/>
+              <a:tabLst>
+                <a:tab pos="911225" algn="l"/>
+                <a:tab pos="1825625" algn="l"/>
+                <a:tab pos="2740025" algn="l"/>
+                <a:tab pos="3654425" algn="l"/>
+                <a:tab pos="4568825" algn="l"/>
+                <a:tab pos="5483225" algn="l"/>
+                <a:tab pos="6397625" algn="l"/>
+                <a:tab pos="7312025" algn="l"/>
+                <a:tab pos="8226425" algn="l"/>
+                <a:tab pos="9140825" algn="l"/>
+                <a:tab pos="10055225" algn="l"/>
+              </a:tabLst>
             </a:pPr>
             <a:r>
-              <a:rPr lang="en-US" altLang="en-US" dirty="0"/>
-              <a:t>C: </a:t>
-            </a:r>
-            <a:endParaRPr lang="en-US" altLang="en-US" dirty="0" smtClean="0"/>
-          </a:p>
-          <a:p>
-            <a:pPr lvl="2">
+              <a:rPr lang="en-US" sz="1600" dirty="0" smtClean="0">
+                <a:ea typeface="ＭＳ Ｐゴシック" pitchFamily="-112" charset="-128"/>
+              </a:rPr>
+              <a:t>			</a:t>
+            </a:r>
+            <a:r>
+              <a:rPr lang="en-US" sz="2000" dirty="0" smtClean="0">
+                <a:ea typeface="ＭＳ Ｐゴシック" pitchFamily="-112" charset="-128"/>
+              </a:rPr>
+              <a:t>	Integer</a:t>
+            </a:r>
+          </a:p>
+          <a:p>
+            <a:pPr marL="341313" indent="-341313" eaLnBrk="1" hangingPunct="1">
               <a:lnSpc>
-                <a:spcPct val="90000"/>
+                <a:spcPct val="60000"/>
               </a:lnSpc>
+              <a:spcBef>
+                <a:spcPts val="1250"/>
+              </a:spcBef>
+              <a:buClr>
+                <a:schemeClr val="tx1"/>
+              </a:buClr>
+              <a:buFont typeface="Arial" charset="0"/>
               <a:buNone/>
+              <a:tabLst>
+                <a:tab pos="911225" algn="l"/>
+                <a:tab pos="1825625" algn="l"/>
+                <a:tab pos="2740025" algn="l"/>
+                <a:tab pos="3654425" algn="l"/>
+                <a:tab pos="4568825" algn="l"/>
+                <a:tab pos="5483225" algn="l"/>
+                <a:tab pos="6397625" algn="l"/>
+                <a:tab pos="7312025" algn="l"/>
+                <a:tab pos="8226425" algn="l"/>
+                <a:tab pos="9140825" algn="l"/>
+                <a:tab pos="10055225" algn="l"/>
+              </a:tabLst>
             </a:pPr>
             <a:r>
-              <a:rPr lang="en-US" altLang="en-US" dirty="0" smtClean="0"/>
-              <a:t>		</a:t>
-            </a:r>
-            <a:r>
-              <a:rPr lang="en-US" altLang="en-US" dirty="0" err="1" smtClean="0">
+              <a:rPr lang="en-US" sz="1600" dirty="0" smtClean="0">
+                <a:ea typeface="ＭＳ Ｐゴシック" pitchFamily="-112" charset="-128"/>
+              </a:rPr>
+              <a:t>				</a:t>
+            </a:r>
+            <a:r>
+              <a:rPr lang="en-US" sz="2000" dirty="0" smtClean="0">
+                <a:ea typeface="ＭＳ Ｐゴシック" pitchFamily="-112" charset="-128"/>
+              </a:rPr>
+              <a:t>(typically called just after </a:t>
+            </a:r>
+            <a:r>
+              <a:rPr lang="en-US" sz="2000" b="1" dirty="0" err="1" smtClean="0">
                 <a:solidFill>
-                  <a:srgbClr val="0070C0"/>
+                  <a:srgbClr val="800000"/>
                 </a:solidFill>
-              </a:rPr>
-              <a:t>mpi.h</a:t>
-            </a:r>
-            <a:endParaRPr lang="en-US" altLang="en-US" dirty="0">
-              <a:solidFill>
-                <a:srgbClr val="0070C0"/>
-              </a:solidFill>
-            </a:endParaRPr>
-          </a:p>
-          <a:p>
-            <a:pPr lvl="1">
+                <a:latin typeface="Andale Mono" pitchFamily="-112" charset="0"/>
+                <a:ea typeface="ＭＳ Ｐゴシック" pitchFamily="-112" charset="-128"/>
+              </a:rPr>
+              <a:t>MPI_Init</a:t>
+            </a:r>
+            <a:r>
+              <a:rPr lang="en-US" sz="2000" dirty="0" smtClean="0">
+                <a:ea typeface="ＭＳ Ｐゴシック" pitchFamily="-112" charset="-128"/>
+              </a:rPr>
+              <a:t>).</a:t>
+            </a:r>
+          </a:p>
+          <a:p>
+            <a:pPr marL="341313" indent="-341313" eaLnBrk="1" hangingPunct="1">
+              <a:spcBef>
+                <a:spcPts val="1250"/>
+              </a:spcBef>
+              <a:buClr>
+                <a:schemeClr val="tx1"/>
+              </a:buClr>
+              <a:buFont typeface="Courier New" pitchFamily="-112" charset="0"/>
+              <a:buChar char="•"/>
+              <a:tabLst>
+                <a:tab pos="911225" algn="l"/>
+                <a:tab pos="1825625" algn="l"/>
+                <a:tab pos="2740025" algn="l"/>
+                <a:tab pos="3654425" algn="l"/>
+                <a:tab pos="4568825" algn="l"/>
+                <a:tab pos="5483225" algn="l"/>
+                <a:tab pos="6397625" algn="l"/>
+                <a:tab pos="7312025" algn="l"/>
+                <a:tab pos="8226425" algn="l"/>
+                <a:tab pos="9140825" algn="l"/>
+                <a:tab pos="10055225" algn="l"/>
+              </a:tabLst>
+            </a:pPr>
+            <a:r>
+              <a:rPr lang="en-US" sz="2000" b="1" dirty="0" err="1" smtClean="0">
+                <a:solidFill>
+                  <a:srgbClr val="0000FF"/>
+                </a:solidFill>
+                <a:latin typeface="Andale Mono" pitchFamily="-112" charset="0"/>
+                <a:ea typeface="ＭＳ Ｐゴシック" pitchFamily="-112" charset="-128"/>
+              </a:rPr>
+              <a:t>MPI_Comm_rank</a:t>
+            </a:r>
+            <a:r>
+              <a:rPr lang="en-US" sz="2000" b="1" dirty="0" smtClean="0">
+                <a:solidFill>
+                  <a:srgbClr val="800000"/>
+                </a:solidFill>
+                <a:latin typeface="Andale Mono" pitchFamily="-112" charset="0"/>
+                <a:ea typeface="ＭＳ Ｐゴシック" pitchFamily="-112" charset="-128"/>
+              </a:rPr>
+              <a:t> </a:t>
+            </a:r>
+            <a:r>
+              <a:rPr lang="en-US" sz="2000" b="1" dirty="0" smtClean="0">
+                <a:solidFill>
+                  <a:srgbClr val="000000"/>
+                </a:solidFill>
+                <a:latin typeface="Andale Mono" pitchFamily="-112" charset="0"/>
+                <a:ea typeface="ＭＳ Ｐゴシック" pitchFamily="-112" charset="-128"/>
+              </a:rPr>
+              <a:t>:</a:t>
+            </a:r>
+            <a:r>
+              <a:rPr lang="en-US" sz="2000" b="1" dirty="0" smtClean="0">
+                <a:solidFill>
+                  <a:srgbClr val="800000"/>
+                </a:solidFill>
+                <a:latin typeface="Andale Mono" pitchFamily="-112" charset="0"/>
+                <a:ea typeface="ＭＳ Ｐゴシック" pitchFamily="-112" charset="-128"/>
+              </a:rPr>
+              <a:t>   </a:t>
+            </a:r>
+            <a:r>
+              <a:rPr lang="en-US" sz="2000" dirty="0" smtClean="0">
+                <a:ea typeface="ＭＳ Ｐゴシック" pitchFamily="-112" charset="-128"/>
+              </a:rPr>
+              <a:t>gets the process ID  (rank) of the current process, 			integer between 0 and </a:t>
+            </a:r>
+            <a:r>
+              <a:rPr lang="en-US" sz="2000" i="1" dirty="0" smtClean="0">
+                <a:ea typeface="ＭＳ Ｐゴシック" pitchFamily="-112" charset="-128"/>
+              </a:rPr>
+              <a:t>NP</a:t>
+            </a:r>
+            <a:r>
+              <a:rPr lang="en-US" sz="2000" dirty="0" smtClean="0">
+                <a:ea typeface="ＭＳ Ｐゴシック" pitchFamily="-112" charset="-128"/>
+              </a:rPr>
+              <a:t>-1 inclusive </a:t>
+            </a:r>
+          </a:p>
+          <a:p>
+            <a:pPr marL="341313" indent="-341313" eaLnBrk="1" hangingPunct="1">
               <a:lnSpc>
-                <a:spcPct val="90000"/>
+                <a:spcPct val="60000"/>
               </a:lnSpc>
+              <a:spcBef>
+                <a:spcPts val="1250"/>
+              </a:spcBef>
+              <a:buClr>
+                <a:schemeClr val="tx1"/>
+              </a:buClr>
+              <a:buFont typeface="Arial" charset="0"/>
+              <a:buNone/>
+              <a:tabLst>
+                <a:tab pos="911225" algn="l"/>
+                <a:tab pos="1825625" algn="l"/>
+                <a:tab pos="2740025" algn="l"/>
+                <a:tab pos="3654425" algn="l"/>
+                <a:tab pos="4568825" algn="l"/>
+                <a:tab pos="5483225" algn="l"/>
+                <a:tab pos="6397625" algn="l"/>
+                <a:tab pos="7312025" algn="l"/>
+                <a:tab pos="8226425" algn="l"/>
+                <a:tab pos="9140825" algn="l"/>
+                <a:tab pos="10055225" algn="l"/>
+              </a:tabLst>
             </a:pPr>
             <a:r>
-              <a:rPr lang="en-US" altLang="en-US" dirty="0" smtClean="0"/>
-              <a:t>Fortran</a:t>
-            </a:r>
-          </a:p>
-          <a:p>
-            <a:pPr lvl="2">
-              <a:lnSpc>
-                <a:spcPct val="90000"/>
-              </a:lnSpc>
-              <a:buNone/>
-            </a:pPr>
-            <a:r>
-              <a:rPr lang="en-US" altLang="en-US" dirty="0" smtClean="0"/>
-              <a:t>		</a:t>
-            </a:r>
-            <a:r>
-              <a:rPr lang="en-US" altLang="en-US" dirty="0" err="1" smtClean="0">
+              <a:rPr lang="en-US" sz="2000" dirty="0" smtClean="0">
+                <a:ea typeface="ＭＳ Ｐゴシック" pitchFamily="-112" charset="-128"/>
+              </a:rPr>
+              <a:t>				(typically called just after </a:t>
+            </a:r>
+            <a:r>
+              <a:rPr lang="en-US" sz="2000" b="1" dirty="0" err="1" smtClean="0">
                 <a:solidFill>
-                  <a:srgbClr val="0070C0"/>
+                  <a:srgbClr val="800000"/>
                 </a:solidFill>
-              </a:rPr>
-              <a:t>mpif.h</a:t>
-            </a:r>
-            <a:endParaRPr lang="en-US" altLang="en-US" dirty="0" smtClean="0">
-              <a:solidFill>
-                <a:srgbClr val="0070C0"/>
-              </a:solidFill>
-            </a:endParaRPr>
-          </a:p>
-          <a:p>
-            <a:pPr lvl="2">
-              <a:lnSpc>
-                <a:spcPct val="90000"/>
-              </a:lnSpc>
-              <a:buNone/>
-            </a:pPr>
-            <a:r>
-              <a:rPr lang="en-US" altLang="en-US" dirty="0" smtClean="0"/>
-              <a:t>		MPI module </a:t>
-            </a:r>
-            <a:r>
-              <a:rPr lang="en-US" altLang="en-US" dirty="0" smtClean="0">
-                <a:sym typeface="Wingdings" pitchFamily="2" charset="2"/>
-              </a:rPr>
-              <a:t> </a:t>
-            </a:r>
-            <a:r>
-              <a:rPr lang="en-US" altLang="en-US" dirty="0" smtClean="0">
-                <a:solidFill>
-                  <a:srgbClr val="0070C0"/>
-                </a:solidFill>
-                <a:sym typeface="Wingdings" pitchFamily="2" charset="2"/>
-              </a:rPr>
-              <a:t>use MPI</a:t>
-            </a:r>
-            <a:endParaRPr lang="en-US" altLang="en-US" dirty="0">
-              <a:solidFill>
-                <a:srgbClr val="0070C0"/>
-              </a:solidFill>
-            </a:endParaRPr>
-          </a:p>
-          <a:p>
-            <a:pPr>
-              <a:lnSpc>
-                <a:spcPct val="90000"/>
-              </a:lnSpc>
-            </a:pPr>
-            <a:r>
-              <a:rPr lang="en-US" altLang="en-US" dirty="0"/>
-              <a:t>Defines many constants used within MPI programs</a:t>
-            </a:r>
-          </a:p>
-          <a:p>
-            <a:pPr lvl="1">
-              <a:lnSpc>
-                <a:spcPct val="90000"/>
-              </a:lnSpc>
-            </a:pPr>
-            <a:r>
-              <a:rPr lang="en-US" altLang="en-US" dirty="0"/>
-              <a:t>In C, defines the interfaces for the</a:t>
-            </a:r>
-            <a:r>
-              <a:rPr lang="en-US" altLang="en-US" dirty="0">
-                <a:solidFill>
-                  <a:srgbClr val="0070C0"/>
-                </a:solidFill>
-              </a:rPr>
-              <a:t> functions</a:t>
-            </a:r>
-          </a:p>
-          <a:p>
-            <a:pPr lvl="1">
-              <a:lnSpc>
-                <a:spcPct val="90000"/>
-              </a:lnSpc>
-            </a:pPr>
-            <a:r>
-              <a:rPr lang="en-US" altLang="en-US" dirty="0"/>
-              <a:t>In C++, the interfaces are different, so be </a:t>
-            </a:r>
-            <a:r>
-              <a:rPr lang="en-US" altLang="en-US" dirty="0" smtClean="0"/>
-              <a:t>careful</a:t>
-            </a:r>
-          </a:p>
-          <a:p>
-            <a:pPr lvl="1">
-              <a:lnSpc>
-                <a:spcPct val="90000"/>
-              </a:lnSpc>
-            </a:pPr>
-            <a:r>
-              <a:rPr lang="en-US" altLang="en-US" dirty="0" smtClean="0"/>
-              <a:t>In F90, module defines interface for </a:t>
-            </a:r>
-            <a:r>
-              <a:rPr lang="en-US" altLang="en-US" dirty="0" smtClean="0">
-                <a:solidFill>
-                  <a:srgbClr val="0070C0"/>
-                </a:solidFill>
-              </a:rPr>
-              <a:t>subroutines</a:t>
-            </a:r>
-            <a:endParaRPr lang="en-US" altLang="en-US" dirty="0">
-              <a:solidFill>
-                <a:srgbClr val="0070C0"/>
-              </a:solidFill>
-            </a:endParaRPr>
-          </a:p>
-          <a:p>
-            <a:pPr>
-              <a:lnSpc>
-                <a:spcPct val="90000"/>
-              </a:lnSpc>
-            </a:pPr>
-            <a:r>
-              <a:rPr lang="en-US" altLang="en-US" dirty="0"/>
-              <a:t>Compilers know where to find the include files</a:t>
-            </a:r>
-          </a:p>
-          <a:p>
-            <a:pPr lvl="1">
-              <a:lnSpc>
-                <a:spcPct val="90000"/>
-              </a:lnSpc>
-            </a:pPr>
-            <a:r>
-              <a:rPr lang="en-US" altLang="en-US" dirty="0"/>
-              <a:t>regular compilers are usually called through </a:t>
-            </a:r>
-            <a:r>
-              <a:rPr lang="en-US" altLang="en-US" dirty="0" smtClean="0">
-                <a:solidFill>
-                  <a:srgbClr val="0070C0"/>
-                </a:solidFill>
-              </a:rPr>
-              <a:t>mpif90/</a:t>
-            </a:r>
-            <a:r>
-              <a:rPr lang="en-US" altLang="en-US" dirty="0" err="1" smtClean="0">
-                <a:solidFill>
-                  <a:srgbClr val="0070C0"/>
-                </a:solidFill>
-              </a:rPr>
-              <a:t>mpicc</a:t>
-            </a:r>
-            <a:r>
-              <a:rPr lang="en-US" altLang="en-US" dirty="0" smtClean="0">
-                <a:solidFill>
-                  <a:srgbClr val="0070C0"/>
-                </a:solidFill>
-              </a:rPr>
-              <a:t> wrapper scripts</a:t>
-            </a:r>
-            <a:endParaRPr lang="en-US" altLang="en-US" dirty="0">
-              <a:solidFill>
-                <a:srgbClr val="0070C0"/>
-              </a:solidFill>
-            </a:endParaRPr>
+                <a:latin typeface="Andale Mono" pitchFamily="-112" charset="0"/>
+                <a:ea typeface="ＭＳ Ｐゴシック" pitchFamily="-112" charset="-128"/>
+              </a:rPr>
+              <a:t>MPI_Init</a:t>
+            </a:r>
+            <a:r>
+              <a:rPr lang="en-US" sz="2000" dirty="0" smtClean="0">
+                <a:ea typeface="ＭＳ Ｐゴシック" pitchFamily="-112" charset="-128"/>
+              </a:rPr>
+              <a:t>).</a:t>
+            </a:r>
           </a:p>
         </p:txBody>
       </p:sp>
@@ -11291,6 +10914,718 @@
       </p:grpSpPr>
       <p:sp>
         <p:nvSpPr>
+          <p:cNvPr id="143362" name="Rectangle 2"/>
+          <p:cNvSpPr>
+            <a:spLocks noGrp="1" noChangeArrowheads="1"/>
+          </p:cNvSpPr>
+          <p:nvPr>
+            <p:ph type="title"/>
+          </p:nvPr>
+        </p:nvSpPr>
+        <p:spPr>
+          <a:xfrm>
+            <a:off x="457200" y="0"/>
+            <a:ext cx="8229600" cy="1143000"/>
+          </a:xfrm>
+        </p:spPr>
+        <p:txBody>
+          <a:bodyPr/>
+          <a:lstStyle/>
+          <a:p>
+            <a:r>
+              <a:rPr lang="en-US" altLang="en-US" dirty="0"/>
+              <a:t>Communicators</a:t>
+            </a:r>
+          </a:p>
+        </p:txBody>
+      </p:sp>
+      <p:sp>
+        <p:nvSpPr>
+          <p:cNvPr id="143363" name="Rectangle 3"/>
+          <p:cNvSpPr>
+            <a:spLocks noGrp="1" noChangeArrowheads="1"/>
+          </p:cNvSpPr>
+          <p:nvPr>
+            <p:ph type="body" idx="1"/>
+          </p:nvPr>
+        </p:nvSpPr>
+        <p:spPr>
+          <a:xfrm>
+            <a:off x="457200" y="1143000"/>
+            <a:ext cx="8686800" cy="5029200"/>
+          </a:xfrm>
+        </p:spPr>
+        <p:txBody>
+          <a:bodyPr>
+            <a:normAutofit fontScale="92500"/>
+          </a:bodyPr>
+          <a:lstStyle/>
+          <a:p>
+            <a:r>
+              <a:rPr lang="en-US" altLang="en-US" sz="3000" dirty="0"/>
+              <a:t>Communicators</a:t>
+            </a:r>
+          </a:p>
+          <a:p>
+            <a:pPr lvl="1"/>
+            <a:r>
+              <a:rPr lang="en-US" sz="2600" dirty="0" smtClean="0">
+                <a:ea typeface="굴림" pitchFamily="-112" charset="-127"/>
+              </a:rPr>
+              <a:t>MPI uses a communicator objects (and groups) to identify a </a:t>
+            </a:r>
+            <a:r>
+              <a:rPr lang="en-US" sz="2600" dirty="0" smtClean="0">
+                <a:solidFill>
+                  <a:srgbClr val="0070C0"/>
+                </a:solidFill>
+                <a:ea typeface="굴림" pitchFamily="-112" charset="-127"/>
+              </a:rPr>
+              <a:t>set of processes which communicate only within their set</a:t>
+            </a:r>
+            <a:r>
+              <a:rPr lang="en-US" sz="2600" dirty="0" smtClean="0">
+                <a:ea typeface="굴림" pitchFamily="-112" charset="-127"/>
+              </a:rPr>
+              <a:t>.</a:t>
+            </a:r>
+          </a:p>
+          <a:p>
+            <a:pPr lvl="1"/>
+            <a:r>
+              <a:rPr lang="en-US" altLang="en-US" sz="2600" dirty="0" smtClean="0"/>
+              <a:t>MPI_COMM_WORLD </a:t>
+            </a:r>
+            <a:r>
+              <a:rPr lang="en-US" altLang="en-US" sz="2600" dirty="0"/>
+              <a:t>is defined in the MPI include file as </a:t>
+            </a:r>
+            <a:r>
+              <a:rPr lang="en-US" altLang="en-US" sz="2600" dirty="0" smtClean="0"/>
+              <a:t/>
+            </a:r>
+            <a:br>
+              <a:rPr lang="en-US" altLang="en-US" sz="2600" dirty="0" smtClean="0"/>
+            </a:br>
+            <a:r>
+              <a:rPr lang="en-US" altLang="en-US" sz="2600" dirty="0" smtClean="0">
+                <a:solidFill>
+                  <a:srgbClr val="0070C0"/>
+                </a:solidFill>
+              </a:rPr>
+              <a:t>all processes</a:t>
+            </a:r>
+            <a:r>
+              <a:rPr lang="en-US" altLang="en-US" sz="2600" dirty="0" smtClean="0"/>
+              <a:t> (ranks) of </a:t>
+            </a:r>
+            <a:r>
+              <a:rPr lang="en-US" altLang="en-US" sz="2600" dirty="0"/>
+              <a:t>your job</a:t>
+            </a:r>
+          </a:p>
+          <a:p>
+            <a:pPr lvl="1"/>
+            <a:r>
+              <a:rPr lang="en-US" altLang="en-US" sz="2600" dirty="0">
+                <a:solidFill>
+                  <a:srgbClr val="0070C0"/>
+                </a:solidFill>
+              </a:rPr>
+              <a:t>R</a:t>
+            </a:r>
+            <a:r>
+              <a:rPr lang="en-US" altLang="en-US" sz="2600" dirty="0" smtClean="0">
+                <a:solidFill>
+                  <a:srgbClr val="0070C0"/>
+                </a:solidFill>
+              </a:rPr>
+              <a:t>equired</a:t>
+            </a:r>
+            <a:r>
+              <a:rPr lang="en-US" altLang="en-US" sz="2600" dirty="0" smtClean="0"/>
+              <a:t> </a:t>
+            </a:r>
+            <a:r>
+              <a:rPr lang="en-US" altLang="en-US" sz="2600" dirty="0"/>
+              <a:t>parameter </a:t>
+            </a:r>
+            <a:r>
+              <a:rPr lang="en-US" altLang="en-US" sz="2600" dirty="0">
+                <a:solidFill>
+                  <a:srgbClr val="0070C0"/>
+                </a:solidFill>
+              </a:rPr>
+              <a:t>for most MPI calls</a:t>
+            </a:r>
+          </a:p>
+          <a:p>
+            <a:pPr lvl="1"/>
+            <a:r>
+              <a:rPr lang="en-US" altLang="en-US" sz="2600" dirty="0"/>
+              <a:t>Y</a:t>
+            </a:r>
+            <a:r>
+              <a:rPr lang="en-US" altLang="en-US" sz="2600" dirty="0" smtClean="0"/>
+              <a:t>ou </a:t>
+            </a:r>
+            <a:r>
+              <a:rPr lang="en-US" altLang="en-US" sz="2600" dirty="0">
+                <a:solidFill>
+                  <a:srgbClr val="0070C0"/>
+                </a:solidFill>
+              </a:rPr>
+              <a:t>can create subsets</a:t>
+            </a:r>
+            <a:r>
+              <a:rPr lang="en-US" altLang="en-US" sz="2600" dirty="0"/>
+              <a:t> of MPI_COMM_WORLD</a:t>
+            </a:r>
+          </a:p>
+          <a:p>
+            <a:pPr marL="341313" indent="-341313">
+              <a:lnSpc>
+                <a:spcPct val="80000"/>
+              </a:lnSpc>
+              <a:spcBef>
+                <a:spcPts val="1125"/>
+              </a:spcBef>
+              <a:tabLst>
+                <a:tab pos="911225" algn="l"/>
+                <a:tab pos="1825625" algn="l"/>
+                <a:tab pos="2740025" algn="l"/>
+                <a:tab pos="3654425" algn="l"/>
+                <a:tab pos="4568825" algn="l"/>
+                <a:tab pos="5483225" algn="l"/>
+                <a:tab pos="6397625" algn="l"/>
+                <a:tab pos="7312025" algn="l"/>
+                <a:tab pos="8226425" algn="l"/>
+                <a:tab pos="9140825" algn="l"/>
+                <a:tab pos="10055225" algn="l"/>
+              </a:tabLst>
+            </a:pPr>
+            <a:r>
+              <a:rPr lang="en-US" sz="2600" dirty="0" smtClean="0">
+                <a:ea typeface="굴림" pitchFamily="-112" charset="-127"/>
+              </a:rPr>
+              <a:t>Rank</a:t>
+            </a:r>
+          </a:p>
+          <a:p>
+            <a:pPr marL="741363" lvl="1" indent="-284163">
+              <a:lnSpc>
+                <a:spcPct val="80000"/>
+              </a:lnSpc>
+              <a:spcBef>
+                <a:spcPts val="400"/>
+              </a:spcBef>
+              <a:tabLst>
+                <a:tab pos="911225" algn="l"/>
+                <a:tab pos="1825625" algn="l"/>
+                <a:tab pos="2740025" algn="l"/>
+                <a:tab pos="3654425" algn="l"/>
+                <a:tab pos="4568825" algn="l"/>
+                <a:tab pos="5483225" algn="l"/>
+                <a:tab pos="6397625" algn="l"/>
+                <a:tab pos="7312025" algn="l"/>
+                <a:tab pos="8226425" algn="l"/>
+                <a:tab pos="9140825" algn="l"/>
+                <a:tab pos="10055225" algn="l"/>
+              </a:tabLst>
+            </a:pPr>
+            <a:r>
+              <a:rPr lang="en-US" sz="2200" dirty="0" smtClean="0">
+                <a:ea typeface="굴림" pitchFamily="-112" charset="-127"/>
+              </a:rPr>
+              <a:t>Unique </a:t>
+            </a:r>
+            <a:r>
+              <a:rPr lang="en-US" sz="2200" i="1" dirty="0" smtClean="0">
+                <a:solidFill>
+                  <a:srgbClr val="0070C0"/>
+                </a:solidFill>
+                <a:ea typeface="굴림" pitchFamily="-112" charset="-127"/>
+              </a:rPr>
+              <a:t>process ID</a:t>
+            </a:r>
+            <a:r>
+              <a:rPr lang="en-US" sz="2200" dirty="0" smtClean="0">
+                <a:ea typeface="굴림" pitchFamily="-112" charset="-127"/>
+              </a:rPr>
+              <a:t> within a communicator</a:t>
+            </a:r>
+          </a:p>
+          <a:p>
+            <a:pPr marL="741363" lvl="1" indent="-284163">
+              <a:lnSpc>
+                <a:spcPct val="80000"/>
+              </a:lnSpc>
+              <a:spcBef>
+                <a:spcPts val="400"/>
+              </a:spcBef>
+              <a:tabLst>
+                <a:tab pos="911225" algn="l"/>
+                <a:tab pos="1825625" algn="l"/>
+                <a:tab pos="2740025" algn="l"/>
+                <a:tab pos="3654425" algn="l"/>
+                <a:tab pos="4568825" algn="l"/>
+                <a:tab pos="5483225" algn="l"/>
+                <a:tab pos="6397625" algn="l"/>
+                <a:tab pos="7312025" algn="l"/>
+                <a:tab pos="8226425" algn="l"/>
+                <a:tab pos="9140825" algn="l"/>
+                <a:tab pos="10055225" algn="l"/>
+              </a:tabLst>
+            </a:pPr>
+            <a:r>
+              <a:rPr lang="en-US" sz="2200" dirty="0" smtClean="0">
+                <a:ea typeface="굴림" pitchFamily="-112" charset="-127"/>
+              </a:rPr>
+              <a:t>Assigned by the system when the process initializes </a:t>
+            </a:r>
+            <a:r>
+              <a:rPr lang="en-US" sz="1500" dirty="0" smtClean="0">
+                <a:ea typeface="굴림" pitchFamily="-112" charset="-127"/>
+              </a:rPr>
+              <a:t>(for MPI_COMM_WORLD)</a:t>
+            </a:r>
+            <a:endParaRPr lang="en-US" sz="2200" dirty="0" smtClean="0">
+              <a:ea typeface="굴림" pitchFamily="-112" charset="-127"/>
+            </a:endParaRPr>
+          </a:p>
+          <a:p>
+            <a:pPr marL="741363" lvl="1" indent="-284163">
+              <a:lnSpc>
+                <a:spcPct val="80000"/>
+              </a:lnSpc>
+              <a:spcBef>
+                <a:spcPts val="400"/>
+              </a:spcBef>
+              <a:tabLst>
+                <a:tab pos="911225" algn="l"/>
+                <a:tab pos="1825625" algn="l"/>
+                <a:tab pos="2740025" algn="l"/>
+                <a:tab pos="3654425" algn="l"/>
+                <a:tab pos="4568825" algn="l"/>
+                <a:tab pos="5483225" algn="l"/>
+                <a:tab pos="6397625" algn="l"/>
+                <a:tab pos="7312025" algn="l"/>
+                <a:tab pos="8226425" algn="l"/>
+                <a:tab pos="9140825" algn="l"/>
+                <a:tab pos="10055225" algn="l"/>
+              </a:tabLst>
+            </a:pPr>
+            <a:r>
+              <a:rPr lang="en-US" altLang="en-US" sz="2200" dirty="0" smtClean="0"/>
+              <a:t>Processors within a communicator are assigned numbers </a:t>
+            </a:r>
+            <a:r>
+              <a:rPr lang="en-US" altLang="en-US" sz="2200" dirty="0" smtClean="0">
+                <a:solidFill>
+                  <a:srgbClr val="0070C0"/>
+                </a:solidFill>
+              </a:rPr>
+              <a:t>0 to n-1</a:t>
+            </a:r>
+            <a:r>
+              <a:rPr lang="en-US" altLang="en-US" sz="2200" dirty="0" smtClean="0"/>
+              <a:t> (C/F90)</a:t>
+            </a:r>
+          </a:p>
+          <a:p>
+            <a:pPr marL="741363" lvl="1" indent="-284163">
+              <a:lnSpc>
+                <a:spcPct val="80000"/>
+              </a:lnSpc>
+              <a:spcBef>
+                <a:spcPts val="400"/>
+              </a:spcBef>
+              <a:tabLst>
+                <a:tab pos="911225" algn="l"/>
+                <a:tab pos="1825625" algn="l"/>
+                <a:tab pos="2740025" algn="l"/>
+                <a:tab pos="3654425" algn="l"/>
+                <a:tab pos="4568825" algn="l"/>
+                <a:tab pos="5483225" algn="l"/>
+                <a:tab pos="6397625" algn="l"/>
+                <a:tab pos="7312025" algn="l"/>
+                <a:tab pos="8226425" algn="l"/>
+                <a:tab pos="9140825" algn="l"/>
+                <a:tab pos="10055225" algn="l"/>
+              </a:tabLst>
+            </a:pPr>
+            <a:r>
+              <a:rPr lang="en-US" sz="2200" dirty="0" smtClean="0">
+                <a:ea typeface="굴림" pitchFamily="-112" charset="-127"/>
+              </a:rPr>
+              <a:t>Used to specify sources and destinations of messages, </a:t>
+            </a:r>
+            <a:br>
+              <a:rPr lang="en-US" sz="2200" dirty="0" smtClean="0">
+                <a:ea typeface="굴림" pitchFamily="-112" charset="-127"/>
+              </a:rPr>
+            </a:br>
+            <a:r>
+              <a:rPr lang="en-US" sz="2200" dirty="0" smtClean="0">
+                <a:ea typeface="굴림" pitchFamily="-112" charset="-127"/>
+              </a:rPr>
+              <a:t>process specific indexing and operations.</a:t>
+            </a:r>
+          </a:p>
+        </p:txBody>
+      </p:sp>
+    </p:spTree>
+  </p:cSld>
+  <p:clrMapOvr>
+    <a:masterClrMapping/>
+  </p:clrMapOvr>
+  <p:timing>
+    <p:tnLst>
+      <p:par>
+        <p:cTn xmlns:p14="http://schemas.microsoft.com/office/powerpoint/2010/main" id="1" dur="indefinite" restart="never" nodeType="tmRoot"/>
+      </p:par>
+    </p:tnLst>
+  </p:timing>
+</p:sld>
+</file>
+
+<file path=ppt/slides/slide22.xml><?xml version="1.0" encoding="utf-8"?>
+<p:sld xmlns:a="http://schemas.openxmlformats.org/drawingml/2006/main" xmlns:r="http://schemas.openxmlformats.org/officeDocument/2006/relationships" xmlns:p="http://schemas.openxmlformats.org/presentationml/2006/main">
+  <p:cSld>
+    <p:spTree>
+      <p:nvGrpSpPr>
+        <p:cNvPr id="1" name=""/>
+        <p:cNvGrpSpPr/>
+        <p:nvPr/>
+      </p:nvGrpSpPr>
+      <p:grpSpPr>
+        <a:xfrm>
+          <a:off x="0" y="0"/>
+          <a:ext cx="0" cy="0"/>
+          <a:chOff x="0" y="0"/>
+          <a:chExt cx="0" cy="0"/>
+        </a:xfrm>
+      </p:grpSpPr>
+      <p:sp>
+        <p:nvSpPr>
+          <p:cNvPr id="141314" name="Rectangle 2"/>
+          <p:cNvSpPr>
+            <a:spLocks noGrp="1" noChangeArrowheads="1"/>
+          </p:cNvSpPr>
+          <p:nvPr>
+            <p:ph type="title"/>
+          </p:nvPr>
+        </p:nvSpPr>
+        <p:spPr>
+          <a:xfrm>
+            <a:off x="457200" y="0"/>
+            <a:ext cx="8229600" cy="1143000"/>
+          </a:xfrm>
+        </p:spPr>
+        <p:txBody>
+          <a:bodyPr/>
+          <a:lstStyle/>
+          <a:p>
+            <a:r>
+              <a:rPr lang="en-US" altLang="en-US" dirty="0"/>
+              <a:t>Include files</a:t>
+            </a:r>
+          </a:p>
+        </p:txBody>
+      </p:sp>
+      <p:sp>
+        <p:nvSpPr>
+          <p:cNvPr id="141315" name="Rectangle 3"/>
+          <p:cNvSpPr>
+            <a:spLocks noGrp="1" noChangeArrowheads="1"/>
+          </p:cNvSpPr>
+          <p:nvPr>
+            <p:ph type="body" idx="1"/>
+          </p:nvPr>
+        </p:nvSpPr>
+        <p:spPr>
+          <a:xfrm>
+            <a:off x="685800" y="1066800"/>
+            <a:ext cx="7772400" cy="4876800"/>
+          </a:xfrm>
+        </p:spPr>
+        <p:txBody>
+          <a:bodyPr>
+            <a:normAutofit fontScale="85000" lnSpcReduction="10000"/>
+          </a:bodyPr>
+          <a:lstStyle/>
+          <a:p>
+            <a:pPr>
+              <a:lnSpc>
+                <a:spcPct val="90000"/>
+              </a:lnSpc>
+            </a:pPr>
+            <a:r>
+              <a:rPr lang="en-US" altLang="en-US" dirty="0"/>
+              <a:t>The MPI include file</a:t>
+            </a:r>
+          </a:p>
+          <a:p>
+            <a:pPr lvl="1">
+              <a:lnSpc>
+                <a:spcPct val="90000"/>
+              </a:lnSpc>
+            </a:pPr>
+            <a:r>
+              <a:rPr lang="en-US" altLang="en-US" dirty="0"/>
+              <a:t>C: </a:t>
+            </a:r>
+            <a:endParaRPr lang="en-US" altLang="en-US" dirty="0" smtClean="0"/>
+          </a:p>
+          <a:p>
+            <a:pPr lvl="2">
+              <a:lnSpc>
+                <a:spcPct val="90000"/>
+              </a:lnSpc>
+              <a:buNone/>
+            </a:pPr>
+            <a:r>
+              <a:rPr lang="en-US" altLang="en-US" dirty="0" smtClean="0"/>
+              <a:t>		</a:t>
+            </a:r>
+            <a:r>
+              <a:rPr lang="en-US" altLang="en-US" dirty="0" err="1" smtClean="0">
+                <a:solidFill>
+                  <a:srgbClr val="0070C0"/>
+                </a:solidFill>
+              </a:rPr>
+              <a:t>mpi.h</a:t>
+            </a:r>
+            <a:endParaRPr lang="en-US" altLang="en-US" dirty="0">
+              <a:solidFill>
+                <a:srgbClr val="0070C0"/>
+              </a:solidFill>
+            </a:endParaRPr>
+          </a:p>
+          <a:p>
+            <a:pPr lvl="1">
+              <a:lnSpc>
+                <a:spcPct val="90000"/>
+              </a:lnSpc>
+            </a:pPr>
+            <a:r>
+              <a:rPr lang="en-US" altLang="en-US" dirty="0" smtClean="0"/>
+              <a:t>Fortran</a:t>
+            </a:r>
+          </a:p>
+          <a:p>
+            <a:pPr lvl="2">
+              <a:lnSpc>
+                <a:spcPct val="90000"/>
+              </a:lnSpc>
+              <a:buNone/>
+            </a:pPr>
+            <a:r>
+              <a:rPr lang="en-US" altLang="en-US" dirty="0" smtClean="0"/>
+              <a:t>		</a:t>
+            </a:r>
+            <a:r>
+              <a:rPr lang="en-US" altLang="en-US" dirty="0" err="1" smtClean="0">
+                <a:solidFill>
+                  <a:srgbClr val="0070C0"/>
+                </a:solidFill>
+              </a:rPr>
+              <a:t>mpif.h</a:t>
+            </a:r>
+            <a:endParaRPr lang="en-US" altLang="en-US" dirty="0" smtClean="0">
+              <a:solidFill>
+                <a:srgbClr val="0070C0"/>
+              </a:solidFill>
+            </a:endParaRPr>
+          </a:p>
+          <a:p>
+            <a:pPr lvl="2">
+              <a:lnSpc>
+                <a:spcPct val="90000"/>
+              </a:lnSpc>
+              <a:buNone/>
+            </a:pPr>
+            <a:r>
+              <a:rPr lang="en-US" altLang="en-US" dirty="0" smtClean="0"/>
+              <a:t>		MPI module </a:t>
+            </a:r>
+            <a:r>
+              <a:rPr lang="en-US" altLang="en-US" dirty="0" smtClean="0">
+                <a:sym typeface="Wingdings" pitchFamily="2" charset="2"/>
+              </a:rPr>
+              <a:t> </a:t>
+            </a:r>
+            <a:r>
+              <a:rPr lang="en-US" altLang="en-US" dirty="0" smtClean="0">
+                <a:solidFill>
+                  <a:srgbClr val="0070C0"/>
+                </a:solidFill>
+                <a:sym typeface="Wingdings" pitchFamily="2" charset="2"/>
+              </a:rPr>
+              <a:t>use MPI</a:t>
+            </a:r>
+            <a:endParaRPr lang="en-US" altLang="en-US" dirty="0">
+              <a:solidFill>
+                <a:srgbClr val="0070C0"/>
+              </a:solidFill>
+            </a:endParaRPr>
+          </a:p>
+          <a:p>
+            <a:pPr>
+              <a:lnSpc>
+                <a:spcPct val="90000"/>
+              </a:lnSpc>
+            </a:pPr>
+            <a:r>
+              <a:rPr lang="en-US" altLang="en-US" dirty="0"/>
+              <a:t>Defines many constants used within MPI programs</a:t>
+            </a:r>
+          </a:p>
+          <a:p>
+            <a:pPr lvl="1">
+              <a:lnSpc>
+                <a:spcPct val="90000"/>
+              </a:lnSpc>
+            </a:pPr>
+            <a:r>
+              <a:rPr lang="en-US" altLang="en-US" dirty="0"/>
+              <a:t>In C, defines the interfaces for the</a:t>
+            </a:r>
+            <a:r>
+              <a:rPr lang="en-US" altLang="en-US" dirty="0">
+                <a:solidFill>
+                  <a:srgbClr val="0070C0"/>
+                </a:solidFill>
+              </a:rPr>
+              <a:t> functions</a:t>
+            </a:r>
+          </a:p>
+          <a:p>
+            <a:pPr lvl="1">
+              <a:lnSpc>
+                <a:spcPct val="90000"/>
+              </a:lnSpc>
+            </a:pPr>
+            <a:r>
+              <a:rPr lang="en-US" altLang="en-US" dirty="0"/>
+              <a:t>In C++, the interfaces are different, so be </a:t>
+            </a:r>
+            <a:r>
+              <a:rPr lang="en-US" altLang="en-US" dirty="0" smtClean="0"/>
+              <a:t>careful</a:t>
+            </a:r>
+          </a:p>
+          <a:p>
+            <a:pPr lvl="1">
+              <a:lnSpc>
+                <a:spcPct val="90000"/>
+              </a:lnSpc>
+            </a:pPr>
+            <a:r>
+              <a:rPr lang="en-US" altLang="en-US" dirty="0" smtClean="0"/>
+              <a:t>In F90, module defines interface for </a:t>
+            </a:r>
+            <a:r>
+              <a:rPr lang="en-US" altLang="en-US" dirty="0" smtClean="0">
+                <a:solidFill>
+                  <a:srgbClr val="0070C0"/>
+                </a:solidFill>
+              </a:rPr>
+              <a:t>subroutines</a:t>
+            </a:r>
+            <a:endParaRPr lang="en-US" altLang="en-US" dirty="0">
+              <a:solidFill>
+                <a:srgbClr val="0070C0"/>
+              </a:solidFill>
+            </a:endParaRPr>
+          </a:p>
+          <a:p>
+            <a:pPr>
+              <a:lnSpc>
+                <a:spcPct val="90000"/>
+              </a:lnSpc>
+            </a:pPr>
+            <a:r>
+              <a:rPr lang="en-US" altLang="en-US" dirty="0"/>
+              <a:t>Compilers know where to find the include files</a:t>
+            </a:r>
+          </a:p>
+          <a:p>
+            <a:pPr lvl="1">
+              <a:lnSpc>
+                <a:spcPct val="90000"/>
+              </a:lnSpc>
+            </a:pPr>
+            <a:r>
+              <a:rPr lang="en-US" altLang="en-US" dirty="0"/>
+              <a:t>regular compilers are usually called through </a:t>
+            </a:r>
+            <a:r>
+              <a:rPr lang="en-US" altLang="en-US" dirty="0" smtClean="0">
+                <a:solidFill>
+                  <a:srgbClr val="0070C0"/>
+                </a:solidFill>
+              </a:rPr>
+              <a:t>mpif90/</a:t>
+            </a:r>
+            <a:r>
+              <a:rPr lang="en-US" altLang="en-US" dirty="0" err="1" smtClean="0">
+                <a:solidFill>
+                  <a:srgbClr val="0070C0"/>
+                </a:solidFill>
+              </a:rPr>
+              <a:t>mpicc</a:t>
+            </a:r>
+            <a:r>
+              <a:rPr lang="en-US" altLang="en-US" dirty="0" smtClean="0">
+                <a:solidFill>
+                  <a:srgbClr val="0070C0"/>
+                </a:solidFill>
+              </a:rPr>
+              <a:t> wrapper scripts</a:t>
+            </a:r>
+            <a:endParaRPr lang="en-US" altLang="en-US" dirty="0">
+              <a:solidFill>
+                <a:srgbClr val="0070C0"/>
+              </a:solidFill>
+            </a:endParaRPr>
+          </a:p>
+        </p:txBody>
+      </p:sp>
+    </p:spTree>
+  </p:cSld>
+  <p:clrMapOvr>
+    <a:masterClrMapping/>
+  </p:clrMapOvr>
+  <p:timing>
+    <p:tnLst>
+      <p:par>
+        <p:cTn xmlns:p14="http://schemas.microsoft.com/office/powerpoint/2010/main" id="1" dur="indefinite" restart="never" nodeType="tmRoot"/>
+      </p:par>
+    </p:tnLst>
+  </p:timing>
+</p:sld>
+</file>
+
+<file path=ppt/slides/slide23.xml><?xml version="1.0" encoding="utf-8"?>
+<p:sld xmlns:a="http://schemas.openxmlformats.org/drawingml/2006/main" xmlns:r="http://schemas.openxmlformats.org/officeDocument/2006/relationships" xmlns:p="http://schemas.openxmlformats.org/presentationml/2006/main">
+  <p:cSld>
+    <p:spTree>
+      <p:nvGrpSpPr>
+        <p:cNvPr id="1" name=""/>
+        <p:cNvGrpSpPr/>
+        <p:nvPr/>
+      </p:nvGrpSpPr>
+      <p:grpSpPr>
+        <a:xfrm>
+          <a:off x="0" y="0"/>
+          <a:ext cx="0" cy="0"/>
+          <a:chOff x="0" y="0"/>
+          <a:chExt cx="0" cy="0"/>
+        </a:xfrm>
+      </p:grpSpPr>
+      <p:sp>
+        <p:nvSpPr>
           <p:cNvPr id="9" name="Rectangle 8"/>
           <p:cNvSpPr/>
           <p:nvPr/>
@@ -12084,7 +12419,7 @@
             <a:fld id="{251D56EB-2375-43B7-8104-DD7EC416D89A}" type="slidenum">
               <a:rPr lang="en-US" smtClean="0"/>
               <a:pPr/>
-              <a:t>21</a:t>
+              <a:t>23</a:t>
             </a:fld>
             <a:endParaRPr lang="en-US" dirty="0"/>
           </a:p>
@@ -16594,7 +16929,7 @@
 </p:sld>
 </file>
 
-<file path=ppt/slides/slide22.xml><?xml version="1.0" encoding="utf-8"?>
+<file path=ppt/slides/slide24.xml><?xml version="1.0" encoding="utf-8"?>
 <p:sld xmlns:a="http://schemas.openxmlformats.org/drawingml/2006/main" xmlns:r="http://schemas.openxmlformats.org/officeDocument/2006/relationships" xmlns:p="http://schemas.openxmlformats.org/presentationml/2006/main">
   <p:cSld>
     <p:spTree>
@@ -17587,7 +17922,7 @@
 </p:sld>
 </file>
 
-<file path=ppt/slides/slide23.xml><?xml version="1.0" encoding="utf-8"?>
+<file path=ppt/slides/slide25.xml><?xml version="1.0" encoding="utf-8"?>
 <p:sld xmlns:a="http://schemas.openxmlformats.org/drawingml/2006/main" xmlns:r="http://schemas.openxmlformats.org/officeDocument/2006/relationships" xmlns:p="http://schemas.openxmlformats.org/presentationml/2006/main">
   <p:cSld>
     <p:spTree>
@@ -18358,7 +18693,7 @@
 </p:sld>
 </file>
 
-<file path=ppt/slides/slide24.xml><?xml version="1.0" encoding="utf-8"?>
+<file path=ppt/slides/slide26.xml><?xml version="1.0" encoding="utf-8"?>
 <p:sld xmlns:a="http://schemas.openxmlformats.org/drawingml/2006/main" xmlns:r="http://schemas.openxmlformats.org/officeDocument/2006/relationships" xmlns:p="http://schemas.openxmlformats.org/presentationml/2006/main">
   <p:cSld>
     <p:spTree>
@@ -18642,7 +18977,7 @@
 </p:sld>
 </file>
 
-<file path=ppt/slides/slide25.xml><?xml version="1.0" encoding="utf-8"?>
+<file path=ppt/slides/slide27.xml><?xml version="1.0" encoding="utf-8"?>
 <p:sld xmlns:a="http://schemas.openxmlformats.org/drawingml/2006/main" xmlns:r="http://schemas.openxmlformats.org/officeDocument/2006/relationships" xmlns:p="http://schemas.openxmlformats.org/presentationml/2006/main">
   <p:cSld>
     <p:spTree>

</xml_diff>